<commit_message>
updated powerpoint and readme
</commit_message>
<xml_diff>
--- a/ppt/cooking_for_two_presentation.pptx
+++ b/ppt/cooking_for_two_presentation.pptx
@@ -8,10 +8,12 @@
     <p:sldId id="256" r:id="rId2"/>
     <p:sldId id="257" r:id="rId3"/>
     <p:sldId id="258" r:id="rId4"/>
-    <p:sldId id="259" r:id="rId5"/>
-    <p:sldId id="262" r:id="rId6"/>
-    <p:sldId id="261" r:id="rId7"/>
-    <p:sldId id="260" r:id="rId8"/>
+    <p:sldId id="263" r:id="rId5"/>
+    <p:sldId id="264" r:id="rId6"/>
+    <p:sldId id="259" r:id="rId7"/>
+    <p:sldId id="262" r:id="rId8"/>
+    <p:sldId id="261" r:id="rId9"/>
+    <p:sldId id="260" r:id="rId10"/>
   </p:sldIdLst>
   <p:sldSz cx="12192000" cy="6858000"/>
   <p:notesSz cx="6858000" cy="9144000"/>
@@ -110,6 +112,11 @@
       </a:defRPr>
     </a:lvl9pPr>
   </p:defaultTextStyle>
+  <p:extLst>
+    <p:ext uri="{EFAFB233-063F-42B5-8137-9DF3F51BA10A}">
+      <p15:sldGuideLst xmlns:p15="http://schemas.microsoft.com/office/powerpoint/2012/main"/>
+    </p:ext>
+  </p:extLst>
 </p:presentation>
 </file>
 
@@ -1819,7 +1826,7 @@
 </file>
 
 <file path=ppt/diagrams/colors3.xml><?xml version="1.0" encoding="utf-8"?>
-<dgm:colorsDef xmlns:dgm="http://schemas.openxmlformats.org/drawingml/2006/diagram" xmlns:a="http://schemas.openxmlformats.org/drawingml/2006/main" uniqueId="urn:microsoft.com/office/officeart/2018/5/colors/Iconchunking_neutralbg_colorful2">
+<dgm:colorsDef xmlns:dgm="http://schemas.openxmlformats.org/drawingml/2006/diagram" xmlns:a="http://schemas.openxmlformats.org/drawingml/2006/main" uniqueId="urn:microsoft.com/office/officeart/2005/8/colors/colorful2">
   <dgm:title val=""/>
   <dgm:desc val=""/>
   <dgm:catLst>
@@ -1843,9 +1850,7 @@
       <a:schemeClr val="accent3"/>
     </dgm:fillClrLst>
     <dgm:linClrLst meth="repeat">
-      <a:schemeClr val="lt1">
-        <a:alpha val="0"/>
-      </a:schemeClr>
+      <a:schemeClr val="lt1"/>
     </dgm:linClrLst>
     <dgm:effectClrLst/>
     <dgm:txLinClrLst/>
@@ -2518,8 +2523,8 @@
   </dgm:styleLbl>
   <dgm:styleLbl name="bgShp">
     <dgm:fillClrLst meth="repeat">
-      <a:schemeClr val="bg1">
-        <a:lumMod val="95000"/>
+      <a:schemeClr val="accent2">
+        <a:tint val="40000"/>
       </a:schemeClr>
     </dgm:fillClrLst>
     <dgm:linClrLst meth="repeat">
@@ -2603,7 +2608,7 @@
 </file>
 
 <file path=ppt/diagrams/colors4.xml><?xml version="1.0" encoding="utf-8"?>
-<dgm:colorsDef xmlns:dgm="http://schemas.openxmlformats.org/drawingml/2006/diagram" xmlns:a="http://schemas.openxmlformats.org/drawingml/2006/main" uniqueId="urn:microsoft.com/office/officeart/2005/8/colors/colorful2">
+<dgm:colorsDef xmlns:dgm="http://schemas.openxmlformats.org/drawingml/2006/diagram" xmlns:a="http://schemas.openxmlformats.org/drawingml/2006/main" uniqueId="urn:microsoft.com/office/officeart/2018/5/colors/Iconchunking_neutralbg_colorful2">
   <dgm:title val=""/>
   <dgm:desc val=""/>
   <dgm:catLst>
@@ -2627,7 +2632,9 @@
       <a:schemeClr val="accent3"/>
     </dgm:fillClrLst>
     <dgm:linClrLst meth="repeat">
-      <a:schemeClr val="lt1"/>
+      <a:schemeClr val="lt1">
+        <a:alpha val="0"/>
+      </a:schemeClr>
     </dgm:linClrLst>
     <dgm:effectClrLst/>
     <dgm:txLinClrLst/>
@@ -3300,8 +3307,8 @@
   </dgm:styleLbl>
   <dgm:styleLbl name="bgShp">
     <dgm:fillClrLst meth="repeat">
-      <a:schemeClr val="accent2">
-        <a:tint val="40000"/>
+      <a:schemeClr val="bg1">
+        <a:lumMod val="95000"/>
       </a:schemeClr>
     </dgm:fillClrLst>
     <dgm:linClrLst meth="repeat">
@@ -3385,6 +3392,788 @@
 </file>
 
 <file path=ppt/diagrams/colors5.xml><?xml version="1.0" encoding="utf-8"?>
+<dgm:colorsDef xmlns:dgm="http://schemas.openxmlformats.org/drawingml/2006/diagram" xmlns:a="http://schemas.openxmlformats.org/drawingml/2006/main" uniqueId="urn:microsoft.com/office/officeart/2005/8/colors/colorful2">
+  <dgm:title val=""/>
+  <dgm:desc val=""/>
+  <dgm:catLst>
+    <dgm:cat type="colorful" pri="10200"/>
+  </dgm:catLst>
+  <dgm:styleLbl name="node0">
+    <dgm:fillClrLst meth="repeat">
+      <a:schemeClr val="accent1"/>
+    </dgm:fillClrLst>
+    <dgm:linClrLst meth="repeat">
+      <a:schemeClr val="lt1"/>
+    </dgm:linClrLst>
+    <dgm:effectClrLst/>
+    <dgm:txLinClrLst/>
+    <dgm:txFillClrLst/>
+    <dgm:txEffectClrLst/>
+  </dgm:styleLbl>
+  <dgm:styleLbl name="node1">
+    <dgm:fillClrLst>
+      <a:schemeClr val="accent2"/>
+      <a:schemeClr val="accent3"/>
+    </dgm:fillClrLst>
+    <dgm:linClrLst meth="repeat">
+      <a:schemeClr val="lt1"/>
+    </dgm:linClrLst>
+    <dgm:effectClrLst/>
+    <dgm:txLinClrLst/>
+    <dgm:txFillClrLst/>
+    <dgm:txEffectClrLst/>
+  </dgm:styleLbl>
+  <dgm:styleLbl name="alignNode1">
+    <dgm:fillClrLst>
+      <a:schemeClr val="accent2"/>
+      <a:schemeClr val="accent3"/>
+    </dgm:fillClrLst>
+    <dgm:linClrLst>
+      <a:schemeClr val="accent2"/>
+      <a:schemeClr val="accent3"/>
+    </dgm:linClrLst>
+    <dgm:effectClrLst/>
+    <dgm:txLinClrLst/>
+    <dgm:txFillClrLst/>
+    <dgm:txEffectClrLst/>
+  </dgm:styleLbl>
+  <dgm:styleLbl name="lnNode1">
+    <dgm:fillClrLst>
+      <a:schemeClr val="accent2"/>
+      <a:schemeClr val="accent3"/>
+    </dgm:fillClrLst>
+    <dgm:linClrLst meth="repeat">
+      <a:schemeClr val="lt1"/>
+    </dgm:linClrLst>
+    <dgm:effectClrLst/>
+    <dgm:txLinClrLst/>
+    <dgm:txFillClrLst/>
+    <dgm:txEffectClrLst/>
+  </dgm:styleLbl>
+  <dgm:styleLbl name="vennNode1">
+    <dgm:fillClrLst>
+      <a:schemeClr val="accent2">
+        <a:alpha val="50000"/>
+      </a:schemeClr>
+      <a:schemeClr val="accent3">
+        <a:alpha val="50000"/>
+      </a:schemeClr>
+    </dgm:fillClrLst>
+    <dgm:linClrLst meth="repeat">
+      <a:schemeClr val="lt1"/>
+    </dgm:linClrLst>
+    <dgm:effectClrLst/>
+    <dgm:txLinClrLst/>
+    <dgm:txFillClrLst/>
+    <dgm:txEffectClrLst/>
+  </dgm:styleLbl>
+  <dgm:styleLbl name="node2">
+    <dgm:fillClrLst>
+      <a:schemeClr val="accent3"/>
+    </dgm:fillClrLst>
+    <dgm:linClrLst meth="repeat">
+      <a:schemeClr val="lt1"/>
+    </dgm:linClrLst>
+    <dgm:effectClrLst/>
+    <dgm:txLinClrLst/>
+    <dgm:txFillClrLst/>
+    <dgm:txEffectClrLst/>
+  </dgm:styleLbl>
+  <dgm:styleLbl name="node3">
+    <dgm:fillClrLst>
+      <a:schemeClr val="accent4"/>
+    </dgm:fillClrLst>
+    <dgm:linClrLst meth="repeat">
+      <a:schemeClr val="lt1"/>
+    </dgm:linClrLst>
+    <dgm:effectClrLst/>
+    <dgm:txLinClrLst/>
+    <dgm:txFillClrLst/>
+    <dgm:txEffectClrLst/>
+  </dgm:styleLbl>
+  <dgm:styleLbl name="node4">
+    <dgm:fillClrLst>
+      <a:schemeClr val="accent5"/>
+    </dgm:fillClrLst>
+    <dgm:linClrLst meth="repeat">
+      <a:schemeClr val="lt1"/>
+    </dgm:linClrLst>
+    <dgm:effectClrLst/>
+    <dgm:txLinClrLst/>
+    <dgm:txFillClrLst/>
+    <dgm:txEffectClrLst/>
+  </dgm:styleLbl>
+  <dgm:styleLbl name="fgImgPlace1">
+    <dgm:fillClrLst>
+      <a:schemeClr val="accent2">
+        <a:tint val="50000"/>
+      </a:schemeClr>
+      <a:schemeClr val="accent3">
+        <a:tint val="50000"/>
+      </a:schemeClr>
+    </dgm:fillClrLst>
+    <dgm:linClrLst meth="repeat">
+      <a:schemeClr val="lt1"/>
+    </dgm:linClrLst>
+    <dgm:effectClrLst/>
+    <dgm:txLinClrLst/>
+    <dgm:txFillClrLst meth="repeat">
+      <a:schemeClr val="lt1"/>
+    </dgm:txFillClrLst>
+    <dgm:txEffectClrLst/>
+  </dgm:styleLbl>
+  <dgm:styleLbl name="alignImgPlace1">
+    <dgm:fillClrLst>
+      <a:schemeClr val="accent2">
+        <a:tint val="50000"/>
+      </a:schemeClr>
+      <a:schemeClr val="accent3">
+        <a:tint val="20000"/>
+      </a:schemeClr>
+    </dgm:fillClrLst>
+    <dgm:linClrLst meth="repeat">
+      <a:schemeClr val="lt1"/>
+    </dgm:linClrLst>
+    <dgm:effectClrLst/>
+    <dgm:txLinClrLst/>
+    <dgm:txFillClrLst meth="repeat">
+      <a:schemeClr val="lt1"/>
+    </dgm:txFillClrLst>
+    <dgm:txEffectClrLst/>
+  </dgm:styleLbl>
+  <dgm:styleLbl name="bgImgPlace1">
+    <dgm:fillClrLst>
+      <a:schemeClr val="accent2">
+        <a:tint val="50000"/>
+      </a:schemeClr>
+      <a:schemeClr val="accent3">
+        <a:tint val="20000"/>
+      </a:schemeClr>
+    </dgm:fillClrLst>
+    <dgm:linClrLst meth="repeat">
+      <a:schemeClr val="lt1"/>
+    </dgm:linClrLst>
+    <dgm:effectClrLst/>
+    <dgm:txLinClrLst/>
+    <dgm:txFillClrLst meth="repeat">
+      <a:schemeClr val="lt1"/>
+    </dgm:txFillClrLst>
+    <dgm:txEffectClrLst/>
+  </dgm:styleLbl>
+  <dgm:styleLbl name="sibTrans2D1">
+    <dgm:fillClrLst>
+      <a:schemeClr val="accent2"/>
+      <a:schemeClr val="accent3"/>
+    </dgm:fillClrLst>
+    <dgm:linClrLst meth="repeat">
+      <a:schemeClr val="lt1"/>
+    </dgm:linClrLst>
+    <dgm:effectClrLst/>
+    <dgm:txLinClrLst/>
+    <dgm:txFillClrLst/>
+    <dgm:txEffectClrLst/>
+  </dgm:styleLbl>
+  <dgm:styleLbl name="fgSibTrans2D1">
+    <dgm:fillClrLst>
+      <a:schemeClr val="accent2"/>
+      <a:schemeClr val="accent3"/>
+    </dgm:fillClrLst>
+    <dgm:linClrLst meth="repeat">
+      <a:schemeClr val="lt1"/>
+    </dgm:linClrLst>
+    <dgm:effectClrLst/>
+    <dgm:txLinClrLst/>
+    <dgm:txFillClrLst meth="repeat">
+      <a:schemeClr val="lt1"/>
+    </dgm:txFillClrLst>
+    <dgm:txEffectClrLst/>
+  </dgm:styleLbl>
+  <dgm:styleLbl name="bgSibTrans2D1">
+    <dgm:fillClrLst>
+      <a:schemeClr val="accent2"/>
+      <a:schemeClr val="accent3"/>
+    </dgm:fillClrLst>
+    <dgm:linClrLst meth="repeat">
+      <a:schemeClr val="lt1"/>
+    </dgm:linClrLst>
+    <dgm:effectClrLst/>
+    <dgm:txLinClrLst/>
+    <dgm:txFillClrLst meth="repeat">
+      <a:schemeClr val="lt1"/>
+    </dgm:txFillClrLst>
+    <dgm:txEffectClrLst/>
+  </dgm:styleLbl>
+  <dgm:styleLbl name="sibTrans1D1">
+    <dgm:fillClrLst/>
+    <dgm:linClrLst>
+      <a:schemeClr val="accent2"/>
+      <a:schemeClr val="accent3"/>
+    </dgm:linClrLst>
+    <dgm:effectClrLst/>
+    <dgm:txLinClrLst/>
+    <dgm:txFillClrLst meth="repeat">
+      <a:schemeClr val="tx1"/>
+    </dgm:txFillClrLst>
+    <dgm:txEffectClrLst/>
+  </dgm:styleLbl>
+  <dgm:styleLbl name="callout">
+    <dgm:fillClrLst meth="repeat">
+      <a:schemeClr val="accent2"/>
+    </dgm:fillClrLst>
+    <dgm:linClrLst meth="repeat">
+      <a:schemeClr val="accent2">
+        <a:tint val="50000"/>
+      </a:schemeClr>
+    </dgm:linClrLst>
+    <dgm:effectClrLst/>
+    <dgm:txLinClrLst/>
+    <dgm:txFillClrLst meth="repeat">
+      <a:schemeClr val="tx1"/>
+    </dgm:txFillClrLst>
+    <dgm:txEffectClrLst/>
+  </dgm:styleLbl>
+  <dgm:styleLbl name="asst0">
+    <dgm:fillClrLst meth="repeat">
+      <a:schemeClr val="accent2"/>
+    </dgm:fillClrLst>
+    <dgm:linClrLst meth="repeat">
+      <a:schemeClr val="lt1">
+        <a:shade val="80000"/>
+      </a:schemeClr>
+    </dgm:linClrLst>
+    <dgm:effectClrLst/>
+    <dgm:txLinClrLst/>
+    <dgm:txFillClrLst/>
+    <dgm:txEffectClrLst/>
+  </dgm:styleLbl>
+  <dgm:styleLbl name="asst1">
+    <dgm:fillClrLst meth="repeat">
+      <a:schemeClr val="accent3"/>
+    </dgm:fillClrLst>
+    <dgm:linClrLst meth="repeat">
+      <a:schemeClr val="lt1">
+        <a:shade val="80000"/>
+      </a:schemeClr>
+    </dgm:linClrLst>
+    <dgm:effectClrLst/>
+    <dgm:txLinClrLst/>
+    <dgm:txFillClrLst/>
+    <dgm:txEffectClrLst/>
+  </dgm:styleLbl>
+  <dgm:styleLbl name="asst2">
+    <dgm:fillClrLst>
+      <a:schemeClr val="accent4"/>
+    </dgm:fillClrLst>
+    <dgm:linClrLst meth="repeat">
+      <a:schemeClr val="lt1"/>
+    </dgm:linClrLst>
+    <dgm:effectClrLst/>
+    <dgm:txLinClrLst/>
+    <dgm:txFillClrLst/>
+    <dgm:txEffectClrLst/>
+  </dgm:styleLbl>
+  <dgm:styleLbl name="asst3">
+    <dgm:fillClrLst>
+      <a:schemeClr val="accent5"/>
+    </dgm:fillClrLst>
+    <dgm:linClrLst meth="repeat">
+      <a:schemeClr val="lt1"/>
+    </dgm:linClrLst>
+    <dgm:effectClrLst/>
+    <dgm:txLinClrLst/>
+    <dgm:txFillClrLst/>
+    <dgm:txEffectClrLst/>
+  </dgm:styleLbl>
+  <dgm:styleLbl name="asst4">
+    <dgm:fillClrLst>
+      <a:schemeClr val="accent6"/>
+    </dgm:fillClrLst>
+    <dgm:linClrLst meth="repeat">
+      <a:schemeClr val="lt1"/>
+    </dgm:linClrLst>
+    <dgm:effectClrLst/>
+    <dgm:txLinClrLst/>
+    <dgm:txFillClrLst/>
+    <dgm:txEffectClrLst/>
+  </dgm:styleLbl>
+  <dgm:styleLbl name="parChTrans2D1">
+    <dgm:fillClrLst meth="repeat">
+      <a:schemeClr val="accent2"/>
+    </dgm:fillClrLst>
+    <dgm:linClrLst meth="repeat">
+      <a:schemeClr val="lt1"/>
+    </dgm:linClrLst>
+    <dgm:effectClrLst/>
+    <dgm:txLinClrLst/>
+    <dgm:txFillClrLst meth="repeat">
+      <a:schemeClr val="lt1"/>
+    </dgm:txFillClrLst>
+    <dgm:txEffectClrLst/>
+  </dgm:styleLbl>
+  <dgm:styleLbl name="parChTrans2D2">
+    <dgm:fillClrLst meth="repeat">
+      <a:schemeClr val="accent3"/>
+    </dgm:fillClrLst>
+    <dgm:linClrLst meth="repeat">
+      <a:schemeClr val="lt1"/>
+    </dgm:linClrLst>
+    <dgm:effectClrLst/>
+    <dgm:txLinClrLst/>
+    <dgm:txFillClrLst/>
+    <dgm:txEffectClrLst/>
+  </dgm:styleLbl>
+  <dgm:styleLbl name="parChTrans2D3">
+    <dgm:fillClrLst meth="repeat">
+      <a:schemeClr val="accent4"/>
+    </dgm:fillClrLst>
+    <dgm:linClrLst meth="repeat">
+      <a:schemeClr val="lt1"/>
+    </dgm:linClrLst>
+    <dgm:effectClrLst/>
+    <dgm:txLinClrLst/>
+    <dgm:txFillClrLst/>
+    <dgm:txEffectClrLst/>
+  </dgm:styleLbl>
+  <dgm:styleLbl name="parChTrans2D4">
+    <dgm:fillClrLst meth="repeat">
+      <a:schemeClr val="accent5"/>
+    </dgm:fillClrLst>
+    <dgm:linClrLst meth="repeat">
+      <a:schemeClr val="lt1"/>
+    </dgm:linClrLst>
+    <dgm:effectClrLst/>
+    <dgm:txLinClrLst/>
+    <dgm:txFillClrLst meth="repeat">
+      <a:schemeClr val="lt1"/>
+    </dgm:txFillClrLst>
+    <dgm:txEffectClrLst/>
+  </dgm:styleLbl>
+  <dgm:styleLbl name="parChTrans1D1">
+    <dgm:fillClrLst meth="repeat">
+      <a:schemeClr val="accent2"/>
+    </dgm:fillClrLst>
+    <dgm:linClrLst meth="repeat">
+      <a:schemeClr val="accent2"/>
+    </dgm:linClrLst>
+    <dgm:effectClrLst/>
+    <dgm:txLinClrLst/>
+    <dgm:txFillClrLst meth="repeat">
+      <a:schemeClr val="tx1"/>
+    </dgm:txFillClrLst>
+    <dgm:txEffectClrLst/>
+  </dgm:styleLbl>
+  <dgm:styleLbl name="parChTrans1D2">
+    <dgm:fillClrLst meth="repeat">
+      <a:schemeClr val="accent2">
+        <a:tint val="90000"/>
+      </a:schemeClr>
+    </dgm:fillClrLst>
+    <dgm:linClrLst meth="repeat">
+      <a:schemeClr val="accent3"/>
+    </dgm:linClrLst>
+    <dgm:effectClrLst/>
+    <dgm:txLinClrLst/>
+    <dgm:txFillClrLst meth="repeat">
+      <a:schemeClr val="tx1"/>
+    </dgm:txFillClrLst>
+    <dgm:txEffectClrLst/>
+  </dgm:styleLbl>
+  <dgm:styleLbl name="parChTrans1D3">
+    <dgm:fillClrLst meth="repeat">
+      <a:schemeClr val="accent2">
+        <a:tint val="70000"/>
+      </a:schemeClr>
+    </dgm:fillClrLst>
+    <dgm:linClrLst meth="repeat">
+      <a:schemeClr val="accent4"/>
+    </dgm:linClrLst>
+    <dgm:effectClrLst/>
+    <dgm:txLinClrLst/>
+    <dgm:txFillClrLst meth="repeat">
+      <a:schemeClr val="tx1"/>
+    </dgm:txFillClrLst>
+    <dgm:txEffectClrLst/>
+  </dgm:styleLbl>
+  <dgm:styleLbl name="parChTrans1D4">
+    <dgm:fillClrLst meth="repeat">
+      <a:schemeClr val="accent2">
+        <a:tint val="50000"/>
+      </a:schemeClr>
+    </dgm:fillClrLst>
+    <dgm:linClrLst meth="repeat">
+      <a:schemeClr val="accent5"/>
+    </dgm:linClrLst>
+    <dgm:effectClrLst/>
+    <dgm:txLinClrLst/>
+    <dgm:txFillClrLst meth="repeat">
+      <a:schemeClr val="tx1"/>
+    </dgm:txFillClrLst>
+    <dgm:txEffectClrLst/>
+  </dgm:styleLbl>
+  <dgm:styleLbl name="fgAcc1">
+    <dgm:fillClrLst meth="repeat">
+      <a:schemeClr val="lt1">
+        <a:alpha val="90000"/>
+      </a:schemeClr>
+    </dgm:fillClrLst>
+    <dgm:linClrLst>
+      <a:schemeClr val="accent2"/>
+      <a:schemeClr val="accent3"/>
+    </dgm:linClrLst>
+    <dgm:effectClrLst/>
+    <dgm:txLinClrLst/>
+    <dgm:txFillClrLst meth="repeat">
+      <a:schemeClr val="dk1"/>
+    </dgm:txFillClrLst>
+    <dgm:txEffectClrLst/>
+  </dgm:styleLbl>
+  <dgm:styleLbl name="conFgAcc1">
+    <dgm:fillClrLst meth="repeat">
+      <a:schemeClr val="lt1">
+        <a:alpha val="90000"/>
+      </a:schemeClr>
+    </dgm:fillClrLst>
+    <dgm:linClrLst>
+      <a:schemeClr val="accent2"/>
+      <a:schemeClr val="accent3"/>
+    </dgm:linClrLst>
+    <dgm:effectClrLst/>
+    <dgm:txLinClrLst/>
+    <dgm:txFillClrLst meth="repeat">
+      <a:schemeClr val="dk1"/>
+    </dgm:txFillClrLst>
+    <dgm:txEffectClrLst/>
+  </dgm:styleLbl>
+  <dgm:styleLbl name="alignAcc1">
+    <dgm:fillClrLst meth="repeat">
+      <a:schemeClr val="lt1">
+        <a:alpha val="90000"/>
+      </a:schemeClr>
+    </dgm:fillClrLst>
+    <dgm:linClrLst>
+      <a:schemeClr val="accent2"/>
+      <a:schemeClr val="accent3"/>
+    </dgm:linClrLst>
+    <dgm:effectClrLst/>
+    <dgm:txLinClrLst/>
+    <dgm:txFillClrLst meth="repeat">
+      <a:schemeClr val="dk1"/>
+    </dgm:txFillClrLst>
+    <dgm:txEffectClrLst/>
+  </dgm:styleLbl>
+  <dgm:styleLbl name="trAlignAcc1">
+    <dgm:fillClrLst meth="repeat">
+      <a:schemeClr val="lt1">
+        <a:alpha val="40000"/>
+      </a:schemeClr>
+    </dgm:fillClrLst>
+    <dgm:linClrLst meth="repeat">
+      <a:schemeClr val="accent2"/>
+    </dgm:linClrLst>
+    <dgm:effectClrLst/>
+    <dgm:txLinClrLst/>
+    <dgm:txFillClrLst meth="repeat">
+      <a:schemeClr val="dk1"/>
+    </dgm:txFillClrLst>
+    <dgm:txEffectClrLst/>
+  </dgm:styleLbl>
+  <dgm:styleLbl name="bgAcc1">
+    <dgm:fillClrLst meth="repeat">
+      <a:schemeClr val="lt1">
+        <a:alpha val="90000"/>
+      </a:schemeClr>
+    </dgm:fillClrLst>
+    <dgm:linClrLst>
+      <a:schemeClr val="accent2"/>
+      <a:schemeClr val="accent3"/>
+    </dgm:linClrLst>
+    <dgm:effectClrLst/>
+    <dgm:txLinClrLst/>
+    <dgm:txFillClrLst meth="repeat">
+      <a:schemeClr val="dk1"/>
+    </dgm:txFillClrLst>
+    <dgm:txEffectClrLst/>
+  </dgm:styleLbl>
+  <dgm:styleLbl name="solidFgAcc1">
+    <dgm:fillClrLst meth="repeat">
+      <a:schemeClr val="lt1"/>
+    </dgm:fillClrLst>
+    <dgm:linClrLst>
+      <a:schemeClr val="accent2"/>
+      <a:schemeClr val="accent3"/>
+    </dgm:linClrLst>
+    <dgm:effectClrLst/>
+    <dgm:txLinClrLst/>
+    <dgm:txFillClrLst meth="repeat">
+      <a:schemeClr val="dk1"/>
+    </dgm:txFillClrLst>
+    <dgm:txEffectClrLst/>
+  </dgm:styleLbl>
+  <dgm:styleLbl name="solidAlignAcc1">
+    <dgm:fillClrLst meth="repeat">
+      <a:schemeClr val="lt1"/>
+    </dgm:fillClrLst>
+    <dgm:linClrLst>
+      <a:schemeClr val="accent2"/>
+      <a:schemeClr val="accent3"/>
+    </dgm:linClrLst>
+    <dgm:effectClrLst/>
+    <dgm:txLinClrLst/>
+    <dgm:txFillClrLst meth="repeat">
+      <a:schemeClr val="dk1"/>
+    </dgm:txFillClrLst>
+    <dgm:txEffectClrLst/>
+  </dgm:styleLbl>
+  <dgm:styleLbl name="solidBgAcc1">
+    <dgm:fillClrLst meth="repeat">
+      <a:schemeClr val="lt1"/>
+    </dgm:fillClrLst>
+    <dgm:linClrLst>
+      <a:schemeClr val="accent2"/>
+      <a:schemeClr val="accent3"/>
+    </dgm:linClrLst>
+    <dgm:effectClrLst/>
+    <dgm:txLinClrLst/>
+    <dgm:txFillClrLst meth="repeat">
+      <a:schemeClr val="dk1"/>
+    </dgm:txFillClrLst>
+    <dgm:txEffectClrLst/>
+  </dgm:styleLbl>
+  <dgm:styleLbl name="fgAccFollowNode1">
+    <dgm:fillClrLst>
+      <a:schemeClr val="accent2">
+        <a:tint val="40000"/>
+        <a:alpha val="90000"/>
+      </a:schemeClr>
+      <a:schemeClr val="accent3">
+        <a:tint val="40000"/>
+        <a:alpha val="90000"/>
+      </a:schemeClr>
+    </dgm:fillClrLst>
+    <dgm:linClrLst>
+      <a:schemeClr val="accent2">
+        <a:tint val="40000"/>
+        <a:alpha val="90000"/>
+      </a:schemeClr>
+      <a:schemeClr val="accent3">
+        <a:tint val="40000"/>
+        <a:alpha val="90000"/>
+      </a:schemeClr>
+    </dgm:linClrLst>
+    <dgm:effectClrLst/>
+    <dgm:txLinClrLst/>
+    <dgm:txFillClrLst meth="repeat">
+      <a:schemeClr val="dk1"/>
+    </dgm:txFillClrLst>
+    <dgm:txEffectClrLst/>
+  </dgm:styleLbl>
+  <dgm:styleLbl name="alignAccFollowNode1">
+    <dgm:fillClrLst>
+      <a:schemeClr val="accent2">
+        <a:tint val="40000"/>
+        <a:alpha val="90000"/>
+      </a:schemeClr>
+      <a:schemeClr val="accent3">
+        <a:tint val="40000"/>
+        <a:alpha val="90000"/>
+      </a:schemeClr>
+    </dgm:fillClrLst>
+    <dgm:linClrLst>
+      <a:schemeClr val="accent2">
+        <a:tint val="40000"/>
+        <a:alpha val="90000"/>
+      </a:schemeClr>
+      <a:schemeClr val="accent3">
+        <a:tint val="40000"/>
+        <a:alpha val="90000"/>
+      </a:schemeClr>
+    </dgm:linClrLst>
+    <dgm:effectClrLst/>
+    <dgm:txLinClrLst/>
+    <dgm:txFillClrLst meth="repeat">
+      <a:schemeClr val="dk1"/>
+    </dgm:txFillClrLst>
+    <dgm:txEffectClrLst/>
+  </dgm:styleLbl>
+  <dgm:styleLbl name="bgAccFollowNode1">
+    <dgm:fillClrLst>
+      <a:schemeClr val="accent2">
+        <a:tint val="40000"/>
+        <a:alpha val="90000"/>
+      </a:schemeClr>
+      <a:schemeClr val="accent3">
+        <a:tint val="40000"/>
+        <a:alpha val="90000"/>
+      </a:schemeClr>
+    </dgm:fillClrLst>
+    <dgm:linClrLst>
+      <a:schemeClr val="accent2">
+        <a:tint val="40000"/>
+        <a:alpha val="90000"/>
+      </a:schemeClr>
+      <a:schemeClr val="accent3">
+        <a:tint val="40000"/>
+        <a:alpha val="90000"/>
+      </a:schemeClr>
+    </dgm:linClrLst>
+    <dgm:effectClrLst/>
+    <dgm:txLinClrLst/>
+    <dgm:txFillClrLst meth="repeat">
+      <a:schemeClr val="dk1"/>
+    </dgm:txFillClrLst>
+    <dgm:txEffectClrLst/>
+  </dgm:styleLbl>
+  <dgm:styleLbl name="fgAcc0">
+    <dgm:fillClrLst meth="repeat">
+      <a:schemeClr val="lt1">
+        <a:alpha val="90000"/>
+      </a:schemeClr>
+    </dgm:fillClrLst>
+    <dgm:linClrLst>
+      <a:schemeClr val="accent1"/>
+    </dgm:linClrLst>
+    <dgm:effectClrLst/>
+    <dgm:txLinClrLst/>
+    <dgm:txFillClrLst meth="repeat">
+      <a:schemeClr val="dk1"/>
+    </dgm:txFillClrLst>
+    <dgm:txEffectClrLst/>
+  </dgm:styleLbl>
+  <dgm:styleLbl name="fgAcc2">
+    <dgm:fillClrLst meth="repeat">
+      <a:schemeClr val="lt1">
+        <a:alpha val="90000"/>
+      </a:schemeClr>
+    </dgm:fillClrLst>
+    <dgm:linClrLst>
+      <a:schemeClr val="accent3"/>
+    </dgm:linClrLst>
+    <dgm:effectClrLst/>
+    <dgm:txLinClrLst/>
+    <dgm:txFillClrLst meth="repeat">
+      <a:schemeClr val="dk1"/>
+    </dgm:txFillClrLst>
+    <dgm:txEffectClrLst/>
+  </dgm:styleLbl>
+  <dgm:styleLbl name="fgAcc3">
+    <dgm:fillClrLst meth="repeat">
+      <a:schemeClr val="lt1">
+        <a:alpha val="90000"/>
+      </a:schemeClr>
+    </dgm:fillClrLst>
+    <dgm:linClrLst>
+      <a:schemeClr val="accent4"/>
+    </dgm:linClrLst>
+    <dgm:effectClrLst/>
+    <dgm:txLinClrLst/>
+    <dgm:txFillClrLst meth="repeat">
+      <a:schemeClr val="dk1"/>
+    </dgm:txFillClrLst>
+    <dgm:txEffectClrLst/>
+  </dgm:styleLbl>
+  <dgm:styleLbl name="fgAcc4">
+    <dgm:fillClrLst meth="repeat">
+      <a:schemeClr val="lt1">
+        <a:alpha val="90000"/>
+      </a:schemeClr>
+    </dgm:fillClrLst>
+    <dgm:linClrLst>
+      <a:schemeClr val="accent5"/>
+    </dgm:linClrLst>
+    <dgm:effectClrLst/>
+    <dgm:txLinClrLst/>
+    <dgm:txFillClrLst meth="repeat">
+      <a:schemeClr val="dk1"/>
+    </dgm:txFillClrLst>
+    <dgm:txEffectClrLst/>
+  </dgm:styleLbl>
+  <dgm:styleLbl name="bgShp">
+    <dgm:fillClrLst meth="repeat">
+      <a:schemeClr val="accent2">
+        <a:tint val="40000"/>
+      </a:schemeClr>
+    </dgm:fillClrLst>
+    <dgm:linClrLst meth="repeat">
+      <a:schemeClr val="dk1"/>
+    </dgm:linClrLst>
+    <dgm:effectClrLst/>
+    <dgm:txLinClrLst/>
+    <dgm:txFillClrLst meth="repeat">
+      <a:schemeClr val="dk1"/>
+    </dgm:txFillClrLst>
+    <dgm:txEffectClrLst/>
+  </dgm:styleLbl>
+  <dgm:styleLbl name="dkBgShp">
+    <dgm:fillClrLst meth="repeat">
+      <a:schemeClr val="accent2">
+        <a:shade val="90000"/>
+      </a:schemeClr>
+    </dgm:fillClrLst>
+    <dgm:linClrLst meth="repeat">
+      <a:schemeClr val="dk1"/>
+    </dgm:linClrLst>
+    <dgm:effectClrLst/>
+    <dgm:txLinClrLst/>
+    <dgm:txFillClrLst meth="repeat">
+      <a:schemeClr val="lt1"/>
+    </dgm:txFillClrLst>
+    <dgm:txEffectClrLst/>
+  </dgm:styleLbl>
+  <dgm:styleLbl name="trBgShp">
+    <dgm:fillClrLst meth="repeat">
+      <a:schemeClr val="accent2">
+        <a:tint val="50000"/>
+        <a:alpha val="40000"/>
+      </a:schemeClr>
+    </dgm:fillClrLst>
+    <dgm:linClrLst meth="repeat">
+      <a:schemeClr val="accent2"/>
+    </dgm:linClrLst>
+    <dgm:effectClrLst/>
+    <dgm:txLinClrLst/>
+    <dgm:txFillClrLst meth="repeat">
+      <a:schemeClr val="lt1"/>
+    </dgm:txFillClrLst>
+    <dgm:txEffectClrLst/>
+  </dgm:styleLbl>
+  <dgm:styleLbl name="fgShp">
+    <dgm:fillClrLst meth="repeat">
+      <a:schemeClr val="accent2">
+        <a:tint val="40000"/>
+      </a:schemeClr>
+    </dgm:fillClrLst>
+    <dgm:linClrLst meth="repeat">
+      <a:schemeClr val="lt1"/>
+    </dgm:linClrLst>
+    <dgm:effectClrLst/>
+    <dgm:txLinClrLst/>
+    <dgm:txFillClrLst meth="repeat">
+      <a:schemeClr val="dk1"/>
+    </dgm:txFillClrLst>
+    <dgm:txEffectClrLst/>
+  </dgm:styleLbl>
+  <dgm:styleLbl name="revTx">
+    <dgm:fillClrLst meth="repeat">
+      <a:schemeClr val="lt1">
+        <a:alpha val="0"/>
+      </a:schemeClr>
+    </dgm:fillClrLst>
+    <dgm:linClrLst meth="repeat">
+      <a:schemeClr val="dk1">
+        <a:alpha val="0"/>
+      </a:schemeClr>
+    </dgm:linClrLst>
+    <dgm:effectClrLst/>
+    <dgm:txLinClrLst/>
+    <dgm:txFillClrLst meth="repeat">
+      <a:schemeClr val="tx1"/>
+    </dgm:txFillClrLst>
+    <dgm:txEffectClrLst/>
+  </dgm:styleLbl>
+</dgm:colorsDef>
+</file>
+
+<file path=ppt/diagrams/colors6.xml><?xml version="1.0" encoding="utf-8"?>
 <dgm:colorsDef xmlns:dgm="http://schemas.openxmlformats.org/drawingml/2006/diagram" xmlns:a="http://schemas.openxmlformats.org/drawingml/2006/main" uniqueId="urn:microsoft.com/office/officeart/2005/8/colors/colorful2">
   <dgm:title val=""/>
   <dgm:desc val=""/>
@@ -4824,6 +5613,253 @@
 <file path=ppt/diagrams/data3.xml><?xml version="1.0" encoding="utf-8"?>
 <dgm:dataModel xmlns:dgm="http://schemas.openxmlformats.org/drawingml/2006/diagram" xmlns:a="http://schemas.openxmlformats.org/drawingml/2006/main">
   <dgm:ptLst>
+    <dgm:pt modelId="{5F3346BB-5FBD-4841-8871-D264B4D7F2F8}" type="doc">
+      <dgm:prSet loTypeId="urn:microsoft.com/office/officeart/2005/8/layout/hierarchy1" loCatId="hierarchy" qsTypeId="urn:microsoft.com/office/officeart/2005/8/quickstyle/simple2" qsCatId="simple" csTypeId="urn:microsoft.com/office/officeart/2005/8/colors/colorful2" csCatId="colorful"/>
+      <dgm:spPr/>
+      <dgm:t>
+        <a:bodyPr/>
+        <a:lstStyle/>
+        <a:p>
+          <a:endParaRPr lang="en-US"/>
+        </a:p>
+      </dgm:t>
+    </dgm:pt>
+    <dgm:pt modelId="{FAFB3A86-E0F4-4CC9-9ABD-EF5B25AA6ACA}">
+      <dgm:prSet/>
+      <dgm:spPr/>
+      <dgm:t>
+        <a:bodyPr/>
+        <a:lstStyle/>
+        <a:p>
+          <a:r>
+            <a:rPr lang="en-AU"/>
+            <a:t>If you don't like a recipe, let us know and we will never suggest it to you again! </a:t>
+          </a:r>
+          <a:br>
+            <a:rPr lang="en-AU"/>
+          </a:br>
+          <a:endParaRPr lang="en-US"/>
+        </a:p>
+      </dgm:t>
+    </dgm:pt>
+    <dgm:pt modelId="{0E188749-6528-4E9D-87E4-43A87713BBB3}" type="parTrans" cxnId="{A9A48B62-3FDD-4083-A0D3-AAD8B99A9091}">
+      <dgm:prSet/>
+      <dgm:spPr/>
+      <dgm:t>
+        <a:bodyPr/>
+        <a:lstStyle/>
+        <a:p>
+          <a:endParaRPr lang="en-US"/>
+        </a:p>
+      </dgm:t>
+    </dgm:pt>
+    <dgm:pt modelId="{C1254C39-2F91-47B0-9B3D-D7C66B21C7EB}" type="sibTrans" cxnId="{A9A48B62-3FDD-4083-A0D3-AAD8B99A9091}">
+      <dgm:prSet/>
+      <dgm:spPr/>
+      <dgm:t>
+        <a:bodyPr/>
+        <a:lstStyle/>
+        <a:p>
+          <a:endParaRPr lang="en-US"/>
+        </a:p>
+      </dgm:t>
+    </dgm:pt>
+    <dgm:pt modelId="{10A8B2D5-F03C-4139-95B3-2FAA2D29A796}">
+      <dgm:prSet/>
+      <dgm:spPr/>
+      <dgm:t>
+        <a:bodyPr/>
+        <a:lstStyle/>
+        <a:p>
+          <a:r>
+            <a:rPr lang="en-AU"/>
+            <a:t>If you LOVE a recipe, tell us and it will be added to your favourites! </a:t>
+          </a:r>
+          <a:endParaRPr lang="en-US"/>
+        </a:p>
+      </dgm:t>
+    </dgm:pt>
+    <dgm:pt modelId="{C693D75B-F79F-4112-9EB5-7467C0B0E0AF}" type="parTrans" cxnId="{E07EE3FF-2CA8-4C70-BE10-BF3BF99D7499}">
+      <dgm:prSet/>
+      <dgm:spPr/>
+      <dgm:t>
+        <a:bodyPr/>
+        <a:lstStyle/>
+        <a:p>
+          <a:endParaRPr lang="en-US"/>
+        </a:p>
+      </dgm:t>
+    </dgm:pt>
+    <dgm:pt modelId="{F3B5008A-D8D3-46B1-9352-ED31E8BAC39B}" type="sibTrans" cxnId="{E07EE3FF-2CA8-4C70-BE10-BF3BF99D7499}">
+      <dgm:prSet/>
+      <dgm:spPr/>
+      <dgm:t>
+        <a:bodyPr/>
+        <a:lstStyle/>
+        <a:p>
+          <a:endParaRPr lang="en-US"/>
+        </a:p>
+      </dgm:t>
+    </dgm:pt>
+    <dgm:pt modelId="{3CB23C1B-B901-4B9F-BF23-1570EAEB36CF}">
+      <dgm:prSet/>
+      <dgm:spPr/>
+      <dgm:t>
+        <a:bodyPr/>
+        <a:lstStyle/>
+        <a:p>
+          <a:r>
+            <a:rPr lang="en-AU"/>
+            <a:t>We would like to implement a feature that writes the ingredients to a text file that can then be used as the user's shopping list.</a:t>
+          </a:r>
+          <a:endParaRPr lang="en-US"/>
+        </a:p>
+      </dgm:t>
+    </dgm:pt>
+    <dgm:pt modelId="{3228F6E3-EB91-454D-BBC0-BB7FAE198A6F}" type="parTrans" cxnId="{115EE2C3-ED28-43F0-81D9-ADF502298AFE}">
+      <dgm:prSet/>
+      <dgm:spPr/>
+      <dgm:t>
+        <a:bodyPr/>
+        <a:lstStyle/>
+        <a:p>
+          <a:endParaRPr lang="en-US"/>
+        </a:p>
+      </dgm:t>
+    </dgm:pt>
+    <dgm:pt modelId="{E8A59AD4-70E4-400F-8D05-2A65440AFAD9}" type="sibTrans" cxnId="{115EE2C3-ED28-43F0-81D9-ADF502298AFE}">
+      <dgm:prSet/>
+      <dgm:spPr/>
+      <dgm:t>
+        <a:bodyPr/>
+        <a:lstStyle/>
+        <a:p>
+          <a:endParaRPr lang="en-US"/>
+        </a:p>
+      </dgm:t>
+    </dgm:pt>
+    <dgm:pt modelId="{554F06E2-59FE-8D48-A103-9A9B374A072A}" type="pres">
+      <dgm:prSet presAssocID="{5F3346BB-5FBD-4841-8871-D264B4D7F2F8}" presName="hierChild1" presStyleCnt="0">
+        <dgm:presLayoutVars>
+          <dgm:chPref val="1"/>
+          <dgm:dir/>
+          <dgm:animOne val="branch"/>
+          <dgm:animLvl val="lvl"/>
+          <dgm:resizeHandles/>
+        </dgm:presLayoutVars>
+      </dgm:prSet>
+      <dgm:spPr/>
+    </dgm:pt>
+    <dgm:pt modelId="{73C95FAC-9046-0F41-A397-4D2327650A99}" type="pres">
+      <dgm:prSet presAssocID="{FAFB3A86-E0F4-4CC9-9ABD-EF5B25AA6ACA}" presName="hierRoot1" presStyleCnt="0"/>
+      <dgm:spPr/>
+    </dgm:pt>
+    <dgm:pt modelId="{99096636-34EE-EB49-8724-A1BDC3FDDA6E}" type="pres">
+      <dgm:prSet presAssocID="{FAFB3A86-E0F4-4CC9-9ABD-EF5B25AA6ACA}" presName="composite" presStyleCnt="0"/>
+      <dgm:spPr/>
+    </dgm:pt>
+    <dgm:pt modelId="{D7B87BB7-66FF-6B4B-AF0C-990363545374}" type="pres">
+      <dgm:prSet presAssocID="{FAFB3A86-E0F4-4CC9-9ABD-EF5B25AA6ACA}" presName="background" presStyleLbl="node0" presStyleIdx="0" presStyleCnt="3"/>
+      <dgm:spPr/>
+    </dgm:pt>
+    <dgm:pt modelId="{036A4CC0-BF84-B94B-B95D-B48BD83B5698}" type="pres">
+      <dgm:prSet presAssocID="{FAFB3A86-E0F4-4CC9-9ABD-EF5B25AA6ACA}" presName="text" presStyleLbl="fgAcc0" presStyleIdx="0" presStyleCnt="3">
+        <dgm:presLayoutVars>
+          <dgm:chPref val="3"/>
+        </dgm:presLayoutVars>
+      </dgm:prSet>
+      <dgm:spPr/>
+    </dgm:pt>
+    <dgm:pt modelId="{0C5906A3-AD65-1740-A466-2A806A429BD7}" type="pres">
+      <dgm:prSet presAssocID="{FAFB3A86-E0F4-4CC9-9ABD-EF5B25AA6ACA}" presName="hierChild2" presStyleCnt="0"/>
+      <dgm:spPr/>
+    </dgm:pt>
+    <dgm:pt modelId="{12C90035-83B3-1A45-BA7B-03544E2B2176}" type="pres">
+      <dgm:prSet presAssocID="{10A8B2D5-F03C-4139-95B3-2FAA2D29A796}" presName="hierRoot1" presStyleCnt="0"/>
+      <dgm:spPr/>
+    </dgm:pt>
+    <dgm:pt modelId="{807AF552-788E-A947-BBB1-DFE30BD722E8}" type="pres">
+      <dgm:prSet presAssocID="{10A8B2D5-F03C-4139-95B3-2FAA2D29A796}" presName="composite" presStyleCnt="0"/>
+      <dgm:spPr/>
+    </dgm:pt>
+    <dgm:pt modelId="{13F8CAD4-D0BF-8A4A-A3BB-051BCAAAF674}" type="pres">
+      <dgm:prSet presAssocID="{10A8B2D5-F03C-4139-95B3-2FAA2D29A796}" presName="background" presStyleLbl="node0" presStyleIdx="1" presStyleCnt="3"/>
+      <dgm:spPr/>
+    </dgm:pt>
+    <dgm:pt modelId="{9AFBF457-60B2-0C43-AFBE-1AE98D67FAC6}" type="pres">
+      <dgm:prSet presAssocID="{10A8B2D5-F03C-4139-95B3-2FAA2D29A796}" presName="text" presStyleLbl="fgAcc0" presStyleIdx="1" presStyleCnt="3">
+        <dgm:presLayoutVars>
+          <dgm:chPref val="3"/>
+        </dgm:presLayoutVars>
+      </dgm:prSet>
+      <dgm:spPr/>
+    </dgm:pt>
+    <dgm:pt modelId="{91F5093A-9474-4145-9754-4049414FB71C}" type="pres">
+      <dgm:prSet presAssocID="{10A8B2D5-F03C-4139-95B3-2FAA2D29A796}" presName="hierChild2" presStyleCnt="0"/>
+      <dgm:spPr/>
+    </dgm:pt>
+    <dgm:pt modelId="{1469A697-720A-8D43-9FDE-E3C58AA96CCC}" type="pres">
+      <dgm:prSet presAssocID="{3CB23C1B-B901-4B9F-BF23-1570EAEB36CF}" presName="hierRoot1" presStyleCnt="0"/>
+      <dgm:spPr/>
+    </dgm:pt>
+    <dgm:pt modelId="{90F468A1-8952-7E45-9982-D639F19DAF31}" type="pres">
+      <dgm:prSet presAssocID="{3CB23C1B-B901-4B9F-BF23-1570EAEB36CF}" presName="composite" presStyleCnt="0"/>
+      <dgm:spPr/>
+    </dgm:pt>
+    <dgm:pt modelId="{6FEDAAE5-CE3F-CA46-8E3B-6E674D6D729A}" type="pres">
+      <dgm:prSet presAssocID="{3CB23C1B-B901-4B9F-BF23-1570EAEB36CF}" presName="background" presStyleLbl="node0" presStyleIdx="2" presStyleCnt="3"/>
+      <dgm:spPr/>
+    </dgm:pt>
+    <dgm:pt modelId="{3F2057EA-636A-A74E-9898-D70F05D25B92}" type="pres">
+      <dgm:prSet presAssocID="{3CB23C1B-B901-4B9F-BF23-1570EAEB36CF}" presName="text" presStyleLbl="fgAcc0" presStyleIdx="2" presStyleCnt="3">
+        <dgm:presLayoutVars>
+          <dgm:chPref val="3"/>
+        </dgm:presLayoutVars>
+      </dgm:prSet>
+      <dgm:spPr/>
+    </dgm:pt>
+    <dgm:pt modelId="{1C08DF83-D7BE-0C40-8FAB-75D471DAEE33}" type="pres">
+      <dgm:prSet presAssocID="{3CB23C1B-B901-4B9F-BF23-1570EAEB36CF}" presName="hierChild2" presStyleCnt="0"/>
+      <dgm:spPr/>
+    </dgm:pt>
+  </dgm:ptLst>
+  <dgm:cxnLst>
+    <dgm:cxn modelId="{502FF73D-92AA-E34B-850D-38D9306D1492}" type="presOf" srcId="{3CB23C1B-B901-4B9F-BF23-1570EAEB36CF}" destId="{3F2057EA-636A-A74E-9898-D70F05D25B92}" srcOrd="0" destOrd="0" presId="urn:microsoft.com/office/officeart/2005/8/layout/hierarchy1"/>
+    <dgm:cxn modelId="{A9A48B62-3FDD-4083-A0D3-AAD8B99A9091}" srcId="{5F3346BB-5FBD-4841-8871-D264B4D7F2F8}" destId="{FAFB3A86-E0F4-4CC9-9ABD-EF5B25AA6ACA}" srcOrd="0" destOrd="0" parTransId="{0E188749-6528-4E9D-87E4-43A87713BBB3}" sibTransId="{C1254C39-2F91-47B0-9B3D-D7C66B21C7EB}"/>
+    <dgm:cxn modelId="{E13BA192-8786-F74E-AB4A-37B4D9C32259}" type="presOf" srcId="{5F3346BB-5FBD-4841-8871-D264B4D7F2F8}" destId="{554F06E2-59FE-8D48-A103-9A9B374A072A}" srcOrd="0" destOrd="0" presId="urn:microsoft.com/office/officeart/2005/8/layout/hierarchy1"/>
+    <dgm:cxn modelId="{115EE2C3-ED28-43F0-81D9-ADF502298AFE}" srcId="{5F3346BB-5FBD-4841-8871-D264B4D7F2F8}" destId="{3CB23C1B-B901-4B9F-BF23-1570EAEB36CF}" srcOrd="2" destOrd="0" parTransId="{3228F6E3-EB91-454D-BBC0-BB7FAE198A6F}" sibTransId="{E8A59AD4-70E4-400F-8D05-2A65440AFAD9}"/>
+    <dgm:cxn modelId="{EEC62CC9-7BE0-564E-A383-F1847D7607DE}" type="presOf" srcId="{FAFB3A86-E0F4-4CC9-9ABD-EF5B25AA6ACA}" destId="{036A4CC0-BF84-B94B-B95D-B48BD83B5698}" srcOrd="0" destOrd="0" presId="urn:microsoft.com/office/officeart/2005/8/layout/hierarchy1"/>
+    <dgm:cxn modelId="{6E42FBE7-B903-D946-AE2B-392670BAF5D7}" type="presOf" srcId="{10A8B2D5-F03C-4139-95B3-2FAA2D29A796}" destId="{9AFBF457-60B2-0C43-AFBE-1AE98D67FAC6}" srcOrd="0" destOrd="0" presId="urn:microsoft.com/office/officeart/2005/8/layout/hierarchy1"/>
+    <dgm:cxn modelId="{E07EE3FF-2CA8-4C70-BE10-BF3BF99D7499}" srcId="{5F3346BB-5FBD-4841-8871-D264B4D7F2F8}" destId="{10A8B2D5-F03C-4139-95B3-2FAA2D29A796}" srcOrd="1" destOrd="0" parTransId="{C693D75B-F79F-4112-9EB5-7467C0B0E0AF}" sibTransId="{F3B5008A-D8D3-46B1-9352-ED31E8BAC39B}"/>
+    <dgm:cxn modelId="{2F7B0F8D-512B-D440-AF25-72577B4629FE}" type="presParOf" srcId="{554F06E2-59FE-8D48-A103-9A9B374A072A}" destId="{73C95FAC-9046-0F41-A397-4D2327650A99}" srcOrd="0" destOrd="0" presId="urn:microsoft.com/office/officeart/2005/8/layout/hierarchy1"/>
+    <dgm:cxn modelId="{887E09E6-1D04-3940-BF23-DD9D95D9067D}" type="presParOf" srcId="{73C95FAC-9046-0F41-A397-4D2327650A99}" destId="{99096636-34EE-EB49-8724-A1BDC3FDDA6E}" srcOrd="0" destOrd="0" presId="urn:microsoft.com/office/officeart/2005/8/layout/hierarchy1"/>
+    <dgm:cxn modelId="{C8FF8912-94CF-734B-B614-9DB16BA15ADE}" type="presParOf" srcId="{99096636-34EE-EB49-8724-A1BDC3FDDA6E}" destId="{D7B87BB7-66FF-6B4B-AF0C-990363545374}" srcOrd="0" destOrd="0" presId="urn:microsoft.com/office/officeart/2005/8/layout/hierarchy1"/>
+    <dgm:cxn modelId="{C9AC2FD0-44D5-2645-92DE-C9BD6492D001}" type="presParOf" srcId="{99096636-34EE-EB49-8724-A1BDC3FDDA6E}" destId="{036A4CC0-BF84-B94B-B95D-B48BD83B5698}" srcOrd="1" destOrd="0" presId="urn:microsoft.com/office/officeart/2005/8/layout/hierarchy1"/>
+    <dgm:cxn modelId="{0A4E5BC8-234D-4F4F-ABA2-3A943C863A50}" type="presParOf" srcId="{73C95FAC-9046-0F41-A397-4D2327650A99}" destId="{0C5906A3-AD65-1740-A466-2A806A429BD7}" srcOrd="1" destOrd="0" presId="urn:microsoft.com/office/officeart/2005/8/layout/hierarchy1"/>
+    <dgm:cxn modelId="{73E95102-4F82-C845-B77C-6143A7E88040}" type="presParOf" srcId="{554F06E2-59FE-8D48-A103-9A9B374A072A}" destId="{12C90035-83B3-1A45-BA7B-03544E2B2176}" srcOrd="1" destOrd="0" presId="urn:microsoft.com/office/officeart/2005/8/layout/hierarchy1"/>
+    <dgm:cxn modelId="{9DEDFA64-78CE-ED4B-ABDE-BFDCE93B568D}" type="presParOf" srcId="{12C90035-83B3-1A45-BA7B-03544E2B2176}" destId="{807AF552-788E-A947-BBB1-DFE30BD722E8}" srcOrd="0" destOrd="0" presId="urn:microsoft.com/office/officeart/2005/8/layout/hierarchy1"/>
+    <dgm:cxn modelId="{B15AB3FE-8118-0E42-A563-62B698EF0479}" type="presParOf" srcId="{807AF552-788E-A947-BBB1-DFE30BD722E8}" destId="{13F8CAD4-D0BF-8A4A-A3BB-051BCAAAF674}" srcOrd="0" destOrd="0" presId="urn:microsoft.com/office/officeart/2005/8/layout/hierarchy1"/>
+    <dgm:cxn modelId="{2D569A0F-0692-C443-8BF8-2AB0F8D89AB6}" type="presParOf" srcId="{807AF552-788E-A947-BBB1-DFE30BD722E8}" destId="{9AFBF457-60B2-0C43-AFBE-1AE98D67FAC6}" srcOrd="1" destOrd="0" presId="urn:microsoft.com/office/officeart/2005/8/layout/hierarchy1"/>
+    <dgm:cxn modelId="{A7EAEE90-6CBF-3B43-A0A7-22592AF1CBD2}" type="presParOf" srcId="{12C90035-83B3-1A45-BA7B-03544E2B2176}" destId="{91F5093A-9474-4145-9754-4049414FB71C}" srcOrd="1" destOrd="0" presId="urn:microsoft.com/office/officeart/2005/8/layout/hierarchy1"/>
+    <dgm:cxn modelId="{9BE5C9C7-B220-0741-B061-C6BF35261CED}" type="presParOf" srcId="{554F06E2-59FE-8D48-A103-9A9B374A072A}" destId="{1469A697-720A-8D43-9FDE-E3C58AA96CCC}" srcOrd="2" destOrd="0" presId="urn:microsoft.com/office/officeart/2005/8/layout/hierarchy1"/>
+    <dgm:cxn modelId="{13F3D089-D5C9-424F-9816-D80F9415D804}" type="presParOf" srcId="{1469A697-720A-8D43-9FDE-E3C58AA96CCC}" destId="{90F468A1-8952-7E45-9982-D639F19DAF31}" srcOrd="0" destOrd="0" presId="urn:microsoft.com/office/officeart/2005/8/layout/hierarchy1"/>
+    <dgm:cxn modelId="{157D79B2-4396-B642-9D04-5C4D7DEEA78D}" type="presParOf" srcId="{90F468A1-8952-7E45-9982-D639F19DAF31}" destId="{6FEDAAE5-CE3F-CA46-8E3B-6E674D6D729A}" srcOrd="0" destOrd="0" presId="urn:microsoft.com/office/officeart/2005/8/layout/hierarchy1"/>
+    <dgm:cxn modelId="{0B2EC102-46CC-3143-843B-17C98B5E05A0}" type="presParOf" srcId="{90F468A1-8952-7E45-9982-D639F19DAF31}" destId="{3F2057EA-636A-A74E-9898-D70F05D25B92}" srcOrd="1" destOrd="0" presId="urn:microsoft.com/office/officeart/2005/8/layout/hierarchy1"/>
+    <dgm:cxn modelId="{9A921BAC-A587-544A-ADDA-9C08512CCD4A}" type="presParOf" srcId="{1469A697-720A-8D43-9FDE-E3C58AA96CCC}" destId="{1C08DF83-D7BE-0C40-8FAB-75D471DAEE33}" srcOrd="1" destOrd="0" presId="urn:microsoft.com/office/officeart/2005/8/layout/hierarchy1"/>
+  </dgm:cxnLst>
+  <dgm:bg/>
+  <dgm:whole/>
+  <dgm:extLst>
+    <a:ext uri="http://schemas.microsoft.com/office/drawing/2008/diagram">
+      <dsp:dataModelExt xmlns:dsp="http://schemas.microsoft.com/office/drawing/2008/diagram" relId="rId6" minVer="http://schemas.openxmlformats.org/drawingml/2006/diagram"/>
+    </a:ext>
+  </dgm:extLst>
+</dgm:dataModel>
+</file>
+
+<file path=ppt/diagrams/data4.xml><?xml version="1.0" encoding="utf-8"?>
+<dgm:dataModel xmlns:dgm="http://schemas.openxmlformats.org/drawingml/2006/diagram" xmlns:a="http://schemas.openxmlformats.org/drawingml/2006/main">
+  <dgm:ptLst>
     <dgm:pt modelId="{390C87A0-8479-4543-B544-293D32E8565D}" type="doc">
       <dgm:prSet loTypeId="urn:microsoft.com/office/officeart/2018/2/layout/IconLabelList" loCatId="icon" qsTypeId="urn:microsoft.com/office/officeart/2005/8/quickstyle/simple4" qsCatId="simple" csTypeId="urn:microsoft.com/office/officeart/2018/5/colors/Iconchunking_neutralbg_colorful2" csCatId="colorful" phldr="1"/>
       <dgm:spPr/>
@@ -5313,7 +6349,7 @@
 </dgm:dataModel>
 </file>
 
-<file path=ppt/diagrams/data4.xml><?xml version="1.0" encoding="utf-8"?>
+<file path=ppt/diagrams/data5.xml><?xml version="1.0" encoding="utf-8"?>
 <dgm:dataModel xmlns:dgm="http://schemas.openxmlformats.org/drawingml/2006/diagram" xmlns:a="http://schemas.openxmlformats.org/drawingml/2006/main">
   <dgm:ptLst>
     <dgm:pt modelId="{72443FA9-6CAB-40DC-A5EA-3DD0BA12501F}" type="doc">
@@ -5609,7 +6645,7 @@
 </dgm:dataModel>
 </file>
 
-<file path=ppt/diagrams/data5.xml><?xml version="1.0" encoding="utf-8"?>
+<file path=ppt/diagrams/data6.xml><?xml version="1.0" encoding="utf-8"?>
 <dgm:dataModel xmlns:dgm="http://schemas.openxmlformats.org/drawingml/2006/diagram" xmlns:a="http://schemas.openxmlformats.org/drawingml/2006/main">
   <dgm:ptLst>
     <dgm:pt modelId="{260D2C08-4BBD-4F16-BCB5-69301B9038AF}" type="doc">
@@ -6691,6 +7727,411 @@
       <dsp:cNvGrpSpPr/>
     </dsp:nvGrpSpPr>
     <dsp:grpSpPr/>
+    <dsp:sp modelId="{D7B87BB7-66FF-6B4B-AF0C-990363545374}">
+      <dsp:nvSpPr>
+        <dsp:cNvPr id="0" name=""/>
+        <dsp:cNvSpPr/>
+      </dsp:nvSpPr>
+      <dsp:spPr>
+        <a:xfrm>
+          <a:off x="0" y="411912"/>
+          <a:ext cx="2887252" cy="1833405"/>
+        </a:xfrm>
+        <a:prstGeom prst="roundRect">
+          <a:avLst>
+            <a:gd name="adj" fmla="val 10000"/>
+          </a:avLst>
+        </a:prstGeom>
+        <a:solidFill>
+          <a:schemeClr val="accent1">
+            <a:hueOff val="0"/>
+            <a:satOff val="0"/>
+            <a:lumOff val="0"/>
+            <a:alphaOff val="0"/>
+          </a:schemeClr>
+        </a:solidFill>
+        <a:ln w="22225" cap="rnd" cmpd="sng" algn="ctr">
+          <a:solidFill>
+            <a:schemeClr val="lt1">
+              <a:hueOff val="0"/>
+              <a:satOff val="0"/>
+              <a:lumOff val="0"/>
+              <a:alphaOff val="0"/>
+            </a:schemeClr>
+          </a:solidFill>
+          <a:prstDash val="solid"/>
+        </a:ln>
+        <a:effectLst/>
+      </dsp:spPr>
+      <dsp:style>
+        <a:lnRef idx="3">
+          <a:scrgbClr r="0" g="0" b="0"/>
+        </a:lnRef>
+        <a:fillRef idx="1">
+          <a:scrgbClr r="0" g="0" b="0"/>
+        </a:fillRef>
+        <a:effectRef idx="1">
+          <a:scrgbClr r="0" g="0" b="0"/>
+        </a:effectRef>
+        <a:fontRef idx="minor">
+          <a:schemeClr val="lt1"/>
+        </a:fontRef>
+      </dsp:style>
+    </dsp:sp>
+    <dsp:sp modelId="{036A4CC0-BF84-B94B-B95D-B48BD83B5698}">
+      <dsp:nvSpPr>
+        <dsp:cNvPr id="0" name=""/>
+        <dsp:cNvSpPr/>
+      </dsp:nvSpPr>
+      <dsp:spPr>
+        <a:xfrm>
+          <a:off x="320805" y="716678"/>
+          <a:ext cx="2887252" cy="1833405"/>
+        </a:xfrm>
+        <a:prstGeom prst="roundRect">
+          <a:avLst>
+            <a:gd name="adj" fmla="val 10000"/>
+          </a:avLst>
+        </a:prstGeom>
+        <a:solidFill>
+          <a:schemeClr val="lt1">
+            <a:alpha val="90000"/>
+            <a:hueOff val="0"/>
+            <a:satOff val="0"/>
+            <a:lumOff val="0"/>
+            <a:alphaOff val="0"/>
+          </a:schemeClr>
+        </a:solidFill>
+        <a:ln w="15875" cap="rnd" cmpd="sng" algn="ctr">
+          <a:solidFill>
+            <a:schemeClr val="accent1">
+              <a:hueOff val="0"/>
+              <a:satOff val="0"/>
+              <a:lumOff val="0"/>
+              <a:alphaOff val="0"/>
+            </a:schemeClr>
+          </a:solidFill>
+          <a:prstDash val="solid"/>
+        </a:ln>
+        <a:effectLst/>
+      </dsp:spPr>
+      <dsp:style>
+        <a:lnRef idx="2">
+          <a:scrgbClr r="0" g="0" b="0"/>
+        </a:lnRef>
+        <a:fillRef idx="1">
+          <a:scrgbClr r="0" g="0" b="0"/>
+        </a:fillRef>
+        <a:effectRef idx="0">
+          <a:scrgbClr r="0" g="0" b="0"/>
+        </a:effectRef>
+        <a:fontRef idx="minor"/>
+      </dsp:style>
+      <dsp:txBody>
+        <a:bodyPr spcFirstLastPara="0" vert="horz" wrap="square" lIns="64770" tIns="64770" rIns="64770" bIns="64770" numCol="1" spcCol="1270" anchor="ctr" anchorCtr="0">
+          <a:noAutofit/>
+        </a:bodyPr>
+        <a:lstStyle/>
+        <a:p>
+          <a:pPr marL="0" lvl="0" indent="0" algn="ctr" defTabSz="755650">
+            <a:lnSpc>
+              <a:spcPct val="90000"/>
+            </a:lnSpc>
+            <a:spcBef>
+              <a:spcPct val="0"/>
+            </a:spcBef>
+            <a:spcAft>
+              <a:spcPct val="35000"/>
+            </a:spcAft>
+            <a:buNone/>
+          </a:pPr>
+          <a:r>
+            <a:rPr lang="en-AU" sz="1700" kern="1200"/>
+            <a:t>If you don't like a recipe, let us know and we will never suggest it to you again! </a:t>
+          </a:r>
+          <a:br>
+            <a:rPr lang="en-AU" sz="1700" kern="1200"/>
+          </a:br>
+          <a:endParaRPr lang="en-US" sz="1700" kern="1200"/>
+        </a:p>
+      </dsp:txBody>
+      <dsp:txXfrm>
+        <a:off x="374504" y="770377"/>
+        <a:ext cx="2779854" cy="1726007"/>
+      </dsp:txXfrm>
+    </dsp:sp>
+    <dsp:sp modelId="{13F8CAD4-D0BF-8A4A-A3BB-051BCAAAF674}">
+      <dsp:nvSpPr>
+        <dsp:cNvPr id="0" name=""/>
+        <dsp:cNvSpPr/>
+      </dsp:nvSpPr>
+      <dsp:spPr>
+        <a:xfrm>
+          <a:off x="3528863" y="411912"/>
+          <a:ext cx="2887252" cy="1833405"/>
+        </a:xfrm>
+        <a:prstGeom prst="roundRect">
+          <a:avLst>
+            <a:gd name="adj" fmla="val 10000"/>
+          </a:avLst>
+        </a:prstGeom>
+        <a:solidFill>
+          <a:schemeClr val="accent1">
+            <a:hueOff val="0"/>
+            <a:satOff val="0"/>
+            <a:lumOff val="0"/>
+            <a:alphaOff val="0"/>
+          </a:schemeClr>
+        </a:solidFill>
+        <a:ln w="22225" cap="rnd" cmpd="sng" algn="ctr">
+          <a:solidFill>
+            <a:schemeClr val="lt1">
+              <a:hueOff val="0"/>
+              <a:satOff val="0"/>
+              <a:lumOff val="0"/>
+              <a:alphaOff val="0"/>
+            </a:schemeClr>
+          </a:solidFill>
+          <a:prstDash val="solid"/>
+        </a:ln>
+        <a:effectLst/>
+      </dsp:spPr>
+      <dsp:style>
+        <a:lnRef idx="3">
+          <a:scrgbClr r="0" g="0" b="0"/>
+        </a:lnRef>
+        <a:fillRef idx="1">
+          <a:scrgbClr r="0" g="0" b="0"/>
+        </a:fillRef>
+        <a:effectRef idx="1">
+          <a:scrgbClr r="0" g="0" b="0"/>
+        </a:effectRef>
+        <a:fontRef idx="minor">
+          <a:schemeClr val="lt1"/>
+        </a:fontRef>
+      </dsp:style>
+    </dsp:sp>
+    <dsp:sp modelId="{9AFBF457-60B2-0C43-AFBE-1AE98D67FAC6}">
+      <dsp:nvSpPr>
+        <dsp:cNvPr id="0" name=""/>
+        <dsp:cNvSpPr/>
+      </dsp:nvSpPr>
+      <dsp:spPr>
+        <a:xfrm>
+          <a:off x="3849669" y="716678"/>
+          <a:ext cx="2887252" cy="1833405"/>
+        </a:xfrm>
+        <a:prstGeom prst="roundRect">
+          <a:avLst>
+            <a:gd name="adj" fmla="val 10000"/>
+          </a:avLst>
+        </a:prstGeom>
+        <a:solidFill>
+          <a:schemeClr val="lt1">
+            <a:alpha val="90000"/>
+            <a:hueOff val="0"/>
+            <a:satOff val="0"/>
+            <a:lumOff val="0"/>
+            <a:alphaOff val="0"/>
+          </a:schemeClr>
+        </a:solidFill>
+        <a:ln w="15875" cap="rnd" cmpd="sng" algn="ctr">
+          <a:solidFill>
+            <a:schemeClr val="accent1">
+              <a:hueOff val="0"/>
+              <a:satOff val="0"/>
+              <a:lumOff val="0"/>
+              <a:alphaOff val="0"/>
+            </a:schemeClr>
+          </a:solidFill>
+          <a:prstDash val="solid"/>
+        </a:ln>
+        <a:effectLst/>
+      </dsp:spPr>
+      <dsp:style>
+        <a:lnRef idx="2">
+          <a:scrgbClr r="0" g="0" b="0"/>
+        </a:lnRef>
+        <a:fillRef idx="1">
+          <a:scrgbClr r="0" g="0" b="0"/>
+        </a:fillRef>
+        <a:effectRef idx="0">
+          <a:scrgbClr r="0" g="0" b="0"/>
+        </a:effectRef>
+        <a:fontRef idx="minor"/>
+      </dsp:style>
+      <dsp:txBody>
+        <a:bodyPr spcFirstLastPara="0" vert="horz" wrap="square" lIns="64770" tIns="64770" rIns="64770" bIns="64770" numCol="1" spcCol="1270" anchor="ctr" anchorCtr="0">
+          <a:noAutofit/>
+        </a:bodyPr>
+        <a:lstStyle/>
+        <a:p>
+          <a:pPr marL="0" lvl="0" indent="0" algn="ctr" defTabSz="755650">
+            <a:lnSpc>
+              <a:spcPct val="90000"/>
+            </a:lnSpc>
+            <a:spcBef>
+              <a:spcPct val="0"/>
+            </a:spcBef>
+            <a:spcAft>
+              <a:spcPct val="35000"/>
+            </a:spcAft>
+            <a:buNone/>
+          </a:pPr>
+          <a:r>
+            <a:rPr lang="en-AU" sz="1700" kern="1200"/>
+            <a:t>If you LOVE a recipe, tell us and it will be added to your favourites! </a:t>
+          </a:r>
+          <a:endParaRPr lang="en-US" sz="1700" kern="1200"/>
+        </a:p>
+      </dsp:txBody>
+      <dsp:txXfrm>
+        <a:off x="3903368" y="770377"/>
+        <a:ext cx="2779854" cy="1726007"/>
+      </dsp:txXfrm>
+    </dsp:sp>
+    <dsp:sp modelId="{6FEDAAE5-CE3F-CA46-8E3B-6E674D6D729A}">
+      <dsp:nvSpPr>
+        <dsp:cNvPr id="0" name=""/>
+        <dsp:cNvSpPr/>
+      </dsp:nvSpPr>
+      <dsp:spPr>
+        <a:xfrm>
+          <a:off x="7057727" y="411912"/>
+          <a:ext cx="2887252" cy="1833405"/>
+        </a:xfrm>
+        <a:prstGeom prst="roundRect">
+          <a:avLst>
+            <a:gd name="adj" fmla="val 10000"/>
+          </a:avLst>
+        </a:prstGeom>
+        <a:solidFill>
+          <a:schemeClr val="accent1">
+            <a:hueOff val="0"/>
+            <a:satOff val="0"/>
+            <a:lumOff val="0"/>
+            <a:alphaOff val="0"/>
+          </a:schemeClr>
+        </a:solidFill>
+        <a:ln w="22225" cap="rnd" cmpd="sng" algn="ctr">
+          <a:solidFill>
+            <a:schemeClr val="lt1">
+              <a:hueOff val="0"/>
+              <a:satOff val="0"/>
+              <a:lumOff val="0"/>
+              <a:alphaOff val="0"/>
+            </a:schemeClr>
+          </a:solidFill>
+          <a:prstDash val="solid"/>
+        </a:ln>
+        <a:effectLst/>
+      </dsp:spPr>
+      <dsp:style>
+        <a:lnRef idx="3">
+          <a:scrgbClr r="0" g="0" b="0"/>
+        </a:lnRef>
+        <a:fillRef idx="1">
+          <a:scrgbClr r="0" g="0" b="0"/>
+        </a:fillRef>
+        <a:effectRef idx="1">
+          <a:scrgbClr r="0" g="0" b="0"/>
+        </a:effectRef>
+        <a:fontRef idx="minor">
+          <a:schemeClr val="lt1"/>
+        </a:fontRef>
+      </dsp:style>
+    </dsp:sp>
+    <dsp:sp modelId="{3F2057EA-636A-A74E-9898-D70F05D25B92}">
+      <dsp:nvSpPr>
+        <dsp:cNvPr id="0" name=""/>
+        <dsp:cNvSpPr/>
+      </dsp:nvSpPr>
+      <dsp:spPr>
+        <a:xfrm>
+          <a:off x="7378533" y="716678"/>
+          <a:ext cx="2887252" cy="1833405"/>
+        </a:xfrm>
+        <a:prstGeom prst="roundRect">
+          <a:avLst>
+            <a:gd name="adj" fmla="val 10000"/>
+          </a:avLst>
+        </a:prstGeom>
+        <a:solidFill>
+          <a:schemeClr val="lt1">
+            <a:alpha val="90000"/>
+            <a:hueOff val="0"/>
+            <a:satOff val="0"/>
+            <a:lumOff val="0"/>
+            <a:alphaOff val="0"/>
+          </a:schemeClr>
+        </a:solidFill>
+        <a:ln w="15875" cap="rnd" cmpd="sng" algn="ctr">
+          <a:solidFill>
+            <a:schemeClr val="accent1">
+              <a:hueOff val="0"/>
+              <a:satOff val="0"/>
+              <a:lumOff val="0"/>
+              <a:alphaOff val="0"/>
+            </a:schemeClr>
+          </a:solidFill>
+          <a:prstDash val="solid"/>
+        </a:ln>
+        <a:effectLst/>
+      </dsp:spPr>
+      <dsp:style>
+        <a:lnRef idx="2">
+          <a:scrgbClr r="0" g="0" b="0"/>
+        </a:lnRef>
+        <a:fillRef idx="1">
+          <a:scrgbClr r="0" g="0" b="0"/>
+        </a:fillRef>
+        <a:effectRef idx="0">
+          <a:scrgbClr r="0" g="0" b="0"/>
+        </a:effectRef>
+        <a:fontRef idx="minor"/>
+      </dsp:style>
+      <dsp:txBody>
+        <a:bodyPr spcFirstLastPara="0" vert="horz" wrap="square" lIns="64770" tIns="64770" rIns="64770" bIns="64770" numCol="1" spcCol="1270" anchor="ctr" anchorCtr="0">
+          <a:noAutofit/>
+        </a:bodyPr>
+        <a:lstStyle/>
+        <a:p>
+          <a:pPr marL="0" lvl="0" indent="0" algn="ctr" defTabSz="755650">
+            <a:lnSpc>
+              <a:spcPct val="90000"/>
+            </a:lnSpc>
+            <a:spcBef>
+              <a:spcPct val="0"/>
+            </a:spcBef>
+            <a:spcAft>
+              <a:spcPct val="35000"/>
+            </a:spcAft>
+            <a:buNone/>
+          </a:pPr>
+          <a:r>
+            <a:rPr lang="en-AU" sz="1700" kern="1200"/>
+            <a:t>We would like to implement a feature that writes the ingredients to a text file that can then be used as the user's shopping list.</a:t>
+          </a:r>
+          <a:endParaRPr lang="en-US" sz="1700" kern="1200"/>
+        </a:p>
+      </dsp:txBody>
+      <dsp:txXfrm>
+        <a:off x="7432232" y="770377"/>
+        <a:ext cx="2779854" cy="1726007"/>
+      </dsp:txXfrm>
+    </dsp:sp>
+  </dsp:spTree>
+</dsp:drawing>
+</file>
+
+<file path=ppt/diagrams/drawing4.xml><?xml version="1.0" encoding="utf-8"?>
+<dsp:drawing xmlns:dgm="http://schemas.openxmlformats.org/drawingml/2006/diagram" xmlns:dsp="http://schemas.microsoft.com/office/drawing/2008/diagram" xmlns:a="http://schemas.openxmlformats.org/drawingml/2006/main">
+  <dsp:spTree>
+    <dsp:nvGrpSpPr>
+      <dsp:cNvPr id="0" name=""/>
+      <dsp:cNvGrpSpPr/>
+    </dsp:nvGrpSpPr>
+    <dsp:grpSpPr/>
     <dsp:sp modelId="{A6457183-235D-41BA-ADFE-B12A98582F8E}">
       <dsp:nvSpPr>
         <dsp:cNvPr id="0" name=""/>
@@ -7265,7 +8706,7 @@
 </dsp:drawing>
 </file>
 
-<file path=ppt/diagrams/drawing4.xml><?xml version="1.0" encoding="utf-8"?>
+<file path=ppt/diagrams/drawing5.xml><?xml version="1.0" encoding="utf-8"?>
 <dsp:drawing xmlns:dgm="http://schemas.openxmlformats.org/drawingml/2006/diagram" xmlns:dsp="http://schemas.microsoft.com/office/drawing/2008/diagram" xmlns:a="http://schemas.openxmlformats.org/drawingml/2006/main">
   <dsp:spTree>
     <dsp:nvGrpSpPr>
@@ -7892,7 +9333,7 @@
 </dsp:drawing>
 </file>
 
-<file path=ppt/diagrams/drawing5.xml><?xml version="1.0" encoding="utf-8"?>
+<file path=ppt/diagrams/drawing6.xml><?xml version="1.0" encoding="utf-8"?>
 <dsp:drawing xmlns:dgm="http://schemas.openxmlformats.org/drawingml/2006/diagram" xmlns:dsp="http://schemas.microsoft.com/office/drawing/2008/diagram" xmlns:a="http://schemas.openxmlformats.org/drawingml/2006/main">
   <dsp:spTree>
     <dsp:nvGrpSpPr>
@@ -8491,6 +9932,569 @@
 </file>
 
 <file path=ppt/diagrams/layout3.xml><?xml version="1.0" encoding="utf-8"?>
+<dgm:layoutDef xmlns:dgm="http://schemas.openxmlformats.org/drawingml/2006/diagram" xmlns:a="http://schemas.openxmlformats.org/drawingml/2006/main" uniqueId="urn:microsoft.com/office/officeart/2005/8/layout/hierarchy1">
+  <dgm:title val=""/>
+  <dgm:desc val=""/>
+  <dgm:catLst>
+    <dgm:cat type="hierarchy" pri="2000"/>
+  </dgm:catLst>
+  <dgm:sampData>
+    <dgm:dataModel>
+      <dgm:ptLst>
+        <dgm:pt modelId="0" type="doc"/>
+        <dgm:pt modelId="1">
+          <dgm:prSet phldr="1"/>
+        </dgm:pt>
+        <dgm:pt modelId="2">
+          <dgm:prSet phldr="1"/>
+        </dgm:pt>
+        <dgm:pt modelId="21">
+          <dgm:prSet phldr="1"/>
+        </dgm:pt>
+        <dgm:pt modelId="22">
+          <dgm:prSet phldr="1"/>
+        </dgm:pt>
+        <dgm:pt modelId="3">
+          <dgm:prSet phldr="1"/>
+        </dgm:pt>
+        <dgm:pt modelId="31">
+          <dgm:prSet phldr="1"/>
+        </dgm:pt>
+      </dgm:ptLst>
+      <dgm:cxnLst>
+        <dgm:cxn modelId="4" srcId="0" destId="1" srcOrd="0" destOrd="0"/>
+        <dgm:cxn modelId="5" srcId="1" destId="2" srcOrd="0" destOrd="0"/>
+        <dgm:cxn modelId="6" srcId="1" destId="3" srcOrd="1" destOrd="0"/>
+        <dgm:cxn modelId="23" srcId="2" destId="21" srcOrd="0" destOrd="0"/>
+        <dgm:cxn modelId="24" srcId="2" destId="22" srcOrd="1" destOrd="0"/>
+        <dgm:cxn modelId="33" srcId="3" destId="31" srcOrd="0" destOrd="0"/>
+      </dgm:cxnLst>
+      <dgm:bg/>
+      <dgm:whole/>
+    </dgm:dataModel>
+  </dgm:sampData>
+  <dgm:styleData>
+    <dgm:dataModel>
+      <dgm:ptLst>
+        <dgm:pt modelId="0" type="doc"/>
+        <dgm:pt modelId="1"/>
+        <dgm:pt modelId="11"/>
+        <dgm:pt modelId="12"/>
+      </dgm:ptLst>
+      <dgm:cxnLst>
+        <dgm:cxn modelId="2" srcId="0" destId="1" srcOrd="0" destOrd="0"/>
+        <dgm:cxn modelId="13" srcId="1" destId="11" srcOrd="0" destOrd="0"/>
+        <dgm:cxn modelId="14" srcId="1" destId="12" srcOrd="1" destOrd="0"/>
+      </dgm:cxnLst>
+      <dgm:bg/>
+      <dgm:whole/>
+    </dgm:dataModel>
+  </dgm:styleData>
+  <dgm:clrData>
+    <dgm:dataModel>
+      <dgm:ptLst>
+        <dgm:pt modelId="0" type="doc"/>
+        <dgm:pt modelId="1"/>
+        <dgm:pt modelId="2"/>
+        <dgm:pt modelId="21"/>
+        <dgm:pt modelId="211"/>
+        <dgm:pt modelId="3"/>
+        <dgm:pt modelId="31"/>
+        <dgm:pt modelId="311"/>
+      </dgm:ptLst>
+      <dgm:cxnLst>
+        <dgm:cxn modelId="4" srcId="0" destId="1" srcOrd="0" destOrd="0"/>
+        <dgm:cxn modelId="5" srcId="1" destId="2" srcOrd="0" destOrd="0"/>
+        <dgm:cxn modelId="6" srcId="1" destId="3" srcOrd="1" destOrd="0"/>
+        <dgm:cxn modelId="23" srcId="2" destId="21" srcOrd="0" destOrd="0"/>
+        <dgm:cxn modelId="24" srcId="21" destId="211" srcOrd="0" destOrd="0"/>
+        <dgm:cxn modelId="33" srcId="3" destId="31" srcOrd="0" destOrd="0"/>
+        <dgm:cxn modelId="34" srcId="31" destId="311" srcOrd="0" destOrd="0"/>
+      </dgm:cxnLst>
+      <dgm:bg/>
+      <dgm:whole/>
+    </dgm:dataModel>
+  </dgm:clrData>
+  <dgm:layoutNode name="hierChild1">
+    <dgm:varLst>
+      <dgm:chPref val="1"/>
+      <dgm:dir/>
+      <dgm:animOne val="branch"/>
+      <dgm:animLvl val="lvl"/>
+      <dgm:resizeHandles/>
+    </dgm:varLst>
+    <dgm:choose name="Name0">
+      <dgm:if name="Name1" func="var" arg="dir" op="equ" val="norm">
+        <dgm:alg type="hierChild">
+          <dgm:param type="linDir" val="fromL"/>
+        </dgm:alg>
+      </dgm:if>
+      <dgm:else name="Name2">
+        <dgm:alg type="hierChild">
+          <dgm:param type="linDir" val="fromR"/>
+        </dgm:alg>
+      </dgm:else>
+    </dgm:choose>
+    <dgm:shape xmlns:r="http://schemas.openxmlformats.org/officeDocument/2006/relationships" r:blip="">
+      <dgm:adjLst/>
+    </dgm:shape>
+    <dgm:presOf/>
+    <dgm:constrLst>
+      <dgm:constr type="primFontSz" for="des" ptType="node" op="equ" val="65"/>
+      <dgm:constr type="w" for="des" forName="composite" refType="w"/>
+      <dgm:constr type="h" for="des" forName="composite" refType="w" refFor="des" refForName="composite" fact="0.667"/>
+      <dgm:constr type="w" for="des" forName="composite2" refType="w" refFor="des" refForName="composite"/>
+      <dgm:constr type="h" for="des" forName="composite2" refType="h" refFor="des" refForName="composite"/>
+      <dgm:constr type="w" for="des" forName="composite3" refType="w" refFor="des" refForName="composite"/>
+      <dgm:constr type="h" for="des" forName="composite3" refType="h" refFor="des" refForName="composite"/>
+      <dgm:constr type="w" for="des" forName="composite4" refType="w" refFor="des" refForName="composite"/>
+      <dgm:constr type="h" for="des" forName="composite4" refType="h" refFor="des" refForName="composite"/>
+      <dgm:constr type="w" for="des" forName="composite5" refType="w" refFor="des" refForName="composite"/>
+      <dgm:constr type="h" for="des" forName="composite5" refType="h" refFor="des" refForName="composite"/>
+      <dgm:constr type="sibSp" refType="w" refFor="des" refForName="composite" fact="0.1"/>
+      <dgm:constr type="sibSp" for="des" forName="hierChild2" refType="sibSp"/>
+      <dgm:constr type="sibSp" for="des" forName="hierChild3" refType="sibSp"/>
+      <dgm:constr type="sibSp" for="des" forName="hierChild4" refType="sibSp"/>
+      <dgm:constr type="sibSp" for="des" forName="hierChild5" refType="sibSp"/>
+      <dgm:constr type="sibSp" for="des" forName="hierChild6" refType="sibSp"/>
+      <dgm:constr type="sp" for="des" forName="hierRoot1" refType="h" refFor="des" refForName="composite" fact="0.25"/>
+      <dgm:constr type="sp" for="des" forName="hierRoot2" refType="sp" refFor="des" refForName="hierRoot1"/>
+      <dgm:constr type="sp" for="des" forName="hierRoot3" refType="sp" refFor="des" refForName="hierRoot1"/>
+      <dgm:constr type="sp" for="des" forName="hierRoot4" refType="sp" refFor="des" refForName="hierRoot1"/>
+      <dgm:constr type="sp" for="des" forName="hierRoot5" refType="sp" refFor="des" refForName="hierRoot1"/>
+    </dgm:constrLst>
+    <dgm:ruleLst/>
+    <dgm:forEach name="Name3" axis="ch">
+      <dgm:forEach name="Name4" axis="self" ptType="node">
+        <dgm:layoutNode name="hierRoot1">
+          <dgm:alg type="hierRoot"/>
+          <dgm:shape xmlns:r="http://schemas.openxmlformats.org/officeDocument/2006/relationships" r:blip="">
+            <dgm:adjLst/>
+          </dgm:shape>
+          <dgm:presOf/>
+          <dgm:constrLst>
+            <dgm:constr type="bendDist" for="des" ptType="parTrans" refType="sp" fact="0.5"/>
+          </dgm:constrLst>
+          <dgm:ruleLst/>
+          <dgm:layoutNode name="composite">
+            <dgm:alg type="composite"/>
+            <dgm:shape xmlns:r="http://schemas.openxmlformats.org/officeDocument/2006/relationships" r:blip="">
+              <dgm:adjLst/>
+            </dgm:shape>
+            <dgm:presOf/>
+            <dgm:constrLst>
+              <dgm:constr type="w" for="ch" forName="background" refType="w" fact="0.9"/>
+              <dgm:constr type="h" for="ch" forName="background" refType="w" refFor="ch" refForName="background" fact="0.635"/>
+              <dgm:constr type="t" for="ch" forName="background"/>
+              <dgm:constr type="l" for="ch" forName="background"/>
+              <dgm:constr type="w" for="ch" forName="text" refType="w" fact="0.9"/>
+              <dgm:constr type="h" for="ch" forName="text" refType="w" refFor="ch" refForName="text" fact="0.635"/>
+              <dgm:constr type="t" for="ch" forName="text" refType="w" fact="0.095"/>
+              <dgm:constr type="l" for="ch" forName="text" refType="w" fact="0.1"/>
+            </dgm:constrLst>
+            <dgm:ruleLst/>
+            <dgm:layoutNode name="background" styleLbl="node0" moveWith="text">
+              <dgm:alg type="sp"/>
+              <dgm:shape xmlns:r="http://schemas.openxmlformats.org/officeDocument/2006/relationships" type="roundRect" r:blip="">
+                <dgm:adjLst>
+                  <dgm:adj idx="1" val="0.1"/>
+                </dgm:adjLst>
+              </dgm:shape>
+              <dgm:presOf/>
+              <dgm:constrLst/>
+              <dgm:ruleLst/>
+            </dgm:layoutNode>
+            <dgm:layoutNode name="text" styleLbl="fgAcc0">
+              <dgm:varLst>
+                <dgm:chPref val="3"/>
+              </dgm:varLst>
+              <dgm:alg type="tx"/>
+              <dgm:shape xmlns:r="http://schemas.openxmlformats.org/officeDocument/2006/relationships" type="roundRect" r:blip="">
+                <dgm:adjLst>
+                  <dgm:adj idx="1" val="0.1"/>
+                </dgm:adjLst>
+              </dgm:shape>
+              <dgm:presOf axis="self"/>
+              <dgm:constrLst>
+                <dgm:constr type="tMarg" refType="primFontSz" fact="0.3"/>
+                <dgm:constr type="bMarg" refType="primFontSz" fact="0.3"/>
+                <dgm:constr type="lMarg" refType="primFontSz" fact="0.3"/>
+                <dgm:constr type="rMarg" refType="primFontSz" fact="0.3"/>
+              </dgm:constrLst>
+              <dgm:ruleLst>
+                <dgm:rule type="primFontSz" val="5" fact="NaN" max="NaN"/>
+              </dgm:ruleLst>
+            </dgm:layoutNode>
+          </dgm:layoutNode>
+          <dgm:layoutNode name="hierChild2">
+            <dgm:choose name="Name5">
+              <dgm:if name="Name6" func="var" arg="dir" op="equ" val="norm">
+                <dgm:alg type="hierChild">
+                  <dgm:param type="linDir" val="fromL"/>
+                </dgm:alg>
+              </dgm:if>
+              <dgm:else name="Name7">
+                <dgm:alg type="hierChild">
+                  <dgm:param type="linDir" val="fromR"/>
+                </dgm:alg>
+              </dgm:else>
+            </dgm:choose>
+            <dgm:shape xmlns:r="http://schemas.openxmlformats.org/officeDocument/2006/relationships" r:blip="">
+              <dgm:adjLst/>
+            </dgm:shape>
+            <dgm:presOf/>
+            <dgm:constrLst/>
+            <dgm:ruleLst/>
+            <dgm:forEach name="Name8" axis="ch">
+              <dgm:forEach name="Name9" axis="self" ptType="parTrans" cnt="1">
+                <dgm:layoutNode name="Name10">
+                  <dgm:alg type="conn">
+                    <dgm:param type="dim" val="1D"/>
+                    <dgm:param type="endSty" val="noArr"/>
+                    <dgm:param type="connRout" val="bend"/>
+                    <dgm:param type="bendPt" val="end"/>
+                    <dgm:param type="begPts" val="bCtr"/>
+                    <dgm:param type="endPts" val="tCtr"/>
+                    <dgm:param type="srcNode" val="background"/>
+                    <dgm:param type="dstNode" val="background2"/>
+                  </dgm:alg>
+                  <dgm:shape xmlns:r="http://schemas.openxmlformats.org/officeDocument/2006/relationships" type="conn" r:blip="" zOrderOff="-999">
+                    <dgm:adjLst/>
+                  </dgm:shape>
+                  <dgm:presOf axis="self"/>
+                  <dgm:constrLst>
+                    <dgm:constr type="begPad"/>
+                    <dgm:constr type="endPad"/>
+                  </dgm:constrLst>
+                  <dgm:ruleLst/>
+                </dgm:layoutNode>
+              </dgm:forEach>
+              <dgm:forEach name="Name11" axis="self" ptType="node">
+                <dgm:layoutNode name="hierRoot2">
+                  <dgm:alg type="hierRoot"/>
+                  <dgm:shape xmlns:r="http://schemas.openxmlformats.org/officeDocument/2006/relationships" r:blip="">
+                    <dgm:adjLst/>
+                  </dgm:shape>
+                  <dgm:presOf/>
+                  <dgm:constrLst>
+                    <dgm:constr type="bendDist" for="des" ptType="parTrans" refType="sp" fact="0.5"/>
+                  </dgm:constrLst>
+                  <dgm:ruleLst/>
+                  <dgm:layoutNode name="composite2">
+                    <dgm:alg type="composite"/>
+                    <dgm:shape xmlns:r="http://schemas.openxmlformats.org/officeDocument/2006/relationships" r:blip="">
+                      <dgm:adjLst/>
+                    </dgm:shape>
+                    <dgm:presOf/>
+                    <dgm:constrLst>
+                      <dgm:constr type="w" for="ch" forName="background2" refType="w" fact="0.9"/>
+                      <dgm:constr type="h" for="ch" forName="background2" refType="w" refFor="ch" refForName="background2" fact="0.635"/>
+                      <dgm:constr type="t" for="ch" forName="background2"/>
+                      <dgm:constr type="l" for="ch" forName="background2"/>
+                      <dgm:constr type="w" for="ch" forName="text2" refType="w" fact="0.9"/>
+                      <dgm:constr type="h" for="ch" forName="text2" refType="w" refFor="ch" refForName="text2" fact="0.635"/>
+                      <dgm:constr type="t" for="ch" forName="text2" refType="w" fact="0.095"/>
+                      <dgm:constr type="l" for="ch" forName="text2" refType="w" fact="0.1"/>
+                    </dgm:constrLst>
+                    <dgm:ruleLst/>
+                    <dgm:layoutNode name="background2" moveWith="text2">
+                      <dgm:alg type="sp"/>
+                      <dgm:shape xmlns:r="http://schemas.openxmlformats.org/officeDocument/2006/relationships" type="roundRect" r:blip="">
+                        <dgm:adjLst>
+                          <dgm:adj idx="1" val="0.1"/>
+                        </dgm:adjLst>
+                      </dgm:shape>
+                      <dgm:presOf/>
+                      <dgm:constrLst/>
+                      <dgm:ruleLst/>
+                    </dgm:layoutNode>
+                    <dgm:layoutNode name="text2" styleLbl="fgAcc2">
+                      <dgm:varLst>
+                        <dgm:chPref val="3"/>
+                      </dgm:varLst>
+                      <dgm:alg type="tx"/>
+                      <dgm:shape xmlns:r="http://schemas.openxmlformats.org/officeDocument/2006/relationships" type="roundRect" r:blip="">
+                        <dgm:adjLst>
+                          <dgm:adj idx="1" val="0.1"/>
+                        </dgm:adjLst>
+                      </dgm:shape>
+                      <dgm:presOf axis="self"/>
+                      <dgm:constrLst>
+                        <dgm:constr type="tMarg" refType="primFontSz" fact="0.3"/>
+                        <dgm:constr type="bMarg" refType="primFontSz" fact="0.3"/>
+                        <dgm:constr type="lMarg" refType="primFontSz" fact="0.3"/>
+                        <dgm:constr type="rMarg" refType="primFontSz" fact="0.3"/>
+                      </dgm:constrLst>
+                      <dgm:ruleLst>
+                        <dgm:rule type="primFontSz" val="5" fact="NaN" max="NaN"/>
+                      </dgm:ruleLst>
+                    </dgm:layoutNode>
+                  </dgm:layoutNode>
+                  <dgm:layoutNode name="hierChild3">
+                    <dgm:choose name="Name12">
+                      <dgm:if name="Name13" func="var" arg="dir" op="equ" val="norm">
+                        <dgm:alg type="hierChild">
+                          <dgm:param type="linDir" val="fromL"/>
+                        </dgm:alg>
+                      </dgm:if>
+                      <dgm:else name="Name14">
+                        <dgm:alg type="hierChild">
+                          <dgm:param type="linDir" val="fromR"/>
+                        </dgm:alg>
+                      </dgm:else>
+                    </dgm:choose>
+                    <dgm:shape xmlns:r="http://schemas.openxmlformats.org/officeDocument/2006/relationships" r:blip="">
+                      <dgm:adjLst/>
+                    </dgm:shape>
+                    <dgm:presOf/>
+                    <dgm:constrLst/>
+                    <dgm:ruleLst/>
+                    <dgm:forEach name="Name15" axis="ch">
+                      <dgm:forEach name="Name16" axis="self" ptType="parTrans" cnt="1">
+                        <dgm:layoutNode name="Name17">
+                          <dgm:alg type="conn">
+                            <dgm:param type="dim" val="1D"/>
+                            <dgm:param type="endSty" val="noArr"/>
+                            <dgm:param type="connRout" val="bend"/>
+                            <dgm:param type="bendPt" val="end"/>
+                            <dgm:param type="begPts" val="bCtr"/>
+                            <dgm:param type="endPts" val="tCtr"/>
+                            <dgm:param type="srcNode" val="background2"/>
+                            <dgm:param type="dstNode" val="background3"/>
+                          </dgm:alg>
+                          <dgm:shape xmlns:r="http://schemas.openxmlformats.org/officeDocument/2006/relationships" type="conn" r:blip="" zOrderOff="-999">
+                            <dgm:adjLst/>
+                          </dgm:shape>
+                          <dgm:presOf axis="self"/>
+                          <dgm:constrLst>
+                            <dgm:constr type="begPad"/>
+                            <dgm:constr type="endPad"/>
+                          </dgm:constrLst>
+                          <dgm:ruleLst/>
+                        </dgm:layoutNode>
+                      </dgm:forEach>
+                      <dgm:forEach name="Name18" axis="self" ptType="node">
+                        <dgm:layoutNode name="hierRoot3">
+                          <dgm:alg type="hierRoot"/>
+                          <dgm:shape xmlns:r="http://schemas.openxmlformats.org/officeDocument/2006/relationships" r:blip="">
+                            <dgm:adjLst/>
+                          </dgm:shape>
+                          <dgm:presOf/>
+                          <dgm:constrLst>
+                            <dgm:constr type="bendDist" for="des" ptType="parTrans" refType="sp" fact="0.5"/>
+                          </dgm:constrLst>
+                          <dgm:ruleLst/>
+                          <dgm:layoutNode name="composite3">
+                            <dgm:alg type="composite"/>
+                            <dgm:shape xmlns:r="http://schemas.openxmlformats.org/officeDocument/2006/relationships" r:blip="">
+                              <dgm:adjLst/>
+                            </dgm:shape>
+                            <dgm:presOf/>
+                            <dgm:constrLst>
+                              <dgm:constr type="w" for="ch" forName="background3" refType="w" fact="0.9"/>
+                              <dgm:constr type="h" for="ch" forName="background3" refType="w" refFor="ch" refForName="background3" fact="0.635"/>
+                              <dgm:constr type="t" for="ch" forName="background3"/>
+                              <dgm:constr type="l" for="ch" forName="background3"/>
+                              <dgm:constr type="w" for="ch" forName="text3" refType="w" fact="0.9"/>
+                              <dgm:constr type="h" for="ch" forName="text3" refType="w" refFor="ch" refForName="text3" fact="0.635"/>
+                              <dgm:constr type="t" for="ch" forName="text3" refType="w" fact="0.095"/>
+                              <dgm:constr type="l" for="ch" forName="text3" refType="w" fact="0.1"/>
+                            </dgm:constrLst>
+                            <dgm:ruleLst/>
+                            <dgm:layoutNode name="background3" moveWith="text3">
+                              <dgm:alg type="sp"/>
+                              <dgm:shape xmlns:r="http://schemas.openxmlformats.org/officeDocument/2006/relationships" type="roundRect" r:blip="">
+                                <dgm:adjLst>
+                                  <dgm:adj idx="1" val="0.1"/>
+                                </dgm:adjLst>
+                              </dgm:shape>
+                              <dgm:presOf/>
+                              <dgm:constrLst/>
+                              <dgm:ruleLst/>
+                            </dgm:layoutNode>
+                            <dgm:layoutNode name="text3" styleLbl="fgAcc3">
+                              <dgm:varLst>
+                                <dgm:chPref val="3"/>
+                              </dgm:varLst>
+                              <dgm:alg type="tx"/>
+                              <dgm:shape xmlns:r="http://schemas.openxmlformats.org/officeDocument/2006/relationships" type="roundRect" r:blip="">
+                                <dgm:adjLst>
+                                  <dgm:adj idx="1" val="0.1"/>
+                                </dgm:adjLst>
+                              </dgm:shape>
+                              <dgm:presOf axis="self"/>
+                              <dgm:constrLst>
+                                <dgm:constr type="tMarg" refType="primFontSz" fact="0.3"/>
+                                <dgm:constr type="bMarg" refType="primFontSz" fact="0.3"/>
+                                <dgm:constr type="lMarg" refType="primFontSz" fact="0.3"/>
+                                <dgm:constr type="rMarg" refType="primFontSz" fact="0.3"/>
+                              </dgm:constrLst>
+                              <dgm:ruleLst>
+                                <dgm:rule type="primFontSz" val="5" fact="NaN" max="NaN"/>
+                              </dgm:ruleLst>
+                            </dgm:layoutNode>
+                          </dgm:layoutNode>
+                          <dgm:layoutNode name="hierChild4">
+                            <dgm:choose name="Name19">
+                              <dgm:if name="Name20" func="var" arg="dir" op="equ" val="norm">
+                                <dgm:alg type="hierChild">
+                                  <dgm:param type="linDir" val="fromL"/>
+                                </dgm:alg>
+                              </dgm:if>
+                              <dgm:else name="Name21">
+                                <dgm:alg type="hierChild">
+                                  <dgm:param type="linDir" val="fromR"/>
+                                </dgm:alg>
+                              </dgm:else>
+                            </dgm:choose>
+                            <dgm:shape xmlns:r="http://schemas.openxmlformats.org/officeDocument/2006/relationships" r:blip="">
+                              <dgm:adjLst/>
+                            </dgm:shape>
+                            <dgm:presOf/>
+                            <dgm:constrLst/>
+                            <dgm:ruleLst/>
+                            <dgm:forEach name="repeat" axis="ch">
+                              <dgm:forEach name="Name22" axis="self" ptType="parTrans" cnt="1">
+                                <dgm:layoutNode name="Name23">
+                                  <dgm:choose name="Name24">
+                                    <dgm:if name="Name25" axis="self" func="depth" op="lte" val="4">
+                                      <dgm:alg type="conn">
+                                        <dgm:param type="dim" val="1D"/>
+                                        <dgm:param type="endSty" val="noArr"/>
+                                        <dgm:param type="connRout" val="bend"/>
+                                        <dgm:param type="bendPt" val="end"/>
+                                        <dgm:param type="begPts" val="bCtr"/>
+                                        <dgm:param type="endPts" val="tCtr"/>
+                                        <dgm:param type="srcNode" val="background3"/>
+                                        <dgm:param type="dstNode" val="background4"/>
+                                      </dgm:alg>
+                                    </dgm:if>
+                                    <dgm:else name="Name26">
+                                      <dgm:alg type="conn">
+                                        <dgm:param type="dim" val="1D"/>
+                                        <dgm:param type="endSty" val="noArr"/>
+                                        <dgm:param type="connRout" val="bend"/>
+                                        <dgm:param type="bendPt" val="end"/>
+                                        <dgm:param type="begPts" val="bCtr"/>
+                                        <dgm:param type="endPts" val="tCtr"/>
+                                        <dgm:param type="srcNode" val="background4"/>
+                                        <dgm:param type="dstNode" val="background4"/>
+                                      </dgm:alg>
+                                    </dgm:else>
+                                  </dgm:choose>
+                                  <dgm:shape xmlns:r="http://schemas.openxmlformats.org/officeDocument/2006/relationships" type="conn" r:blip="" zOrderOff="-999">
+                                    <dgm:adjLst/>
+                                  </dgm:shape>
+                                  <dgm:presOf axis="self"/>
+                                  <dgm:constrLst>
+                                    <dgm:constr type="begPad"/>
+                                    <dgm:constr type="endPad"/>
+                                  </dgm:constrLst>
+                                  <dgm:ruleLst/>
+                                </dgm:layoutNode>
+                              </dgm:forEach>
+                              <dgm:forEach name="Name27" axis="self" ptType="node">
+                                <dgm:layoutNode name="hierRoot4">
+                                  <dgm:alg type="hierRoot"/>
+                                  <dgm:shape xmlns:r="http://schemas.openxmlformats.org/officeDocument/2006/relationships" r:blip="">
+                                    <dgm:adjLst/>
+                                  </dgm:shape>
+                                  <dgm:presOf/>
+                                  <dgm:constrLst>
+                                    <dgm:constr type="bendDist" for="des" ptType="parTrans" refType="sp" fact="0.5"/>
+                                  </dgm:constrLst>
+                                  <dgm:ruleLst/>
+                                  <dgm:layoutNode name="composite4">
+                                    <dgm:alg type="composite"/>
+                                    <dgm:shape xmlns:r="http://schemas.openxmlformats.org/officeDocument/2006/relationships" r:blip="">
+                                      <dgm:adjLst/>
+                                    </dgm:shape>
+                                    <dgm:presOf/>
+                                    <dgm:constrLst>
+                                      <dgm:constr type="w" for="ch" forName="background4" refType="w" fact="0.9"/>
+                                      <dgm:constr type="h" for="ch" forName="background4" refType="w" refFor="ch" refForName="background4" fact="0.635"/>
+                                      <dgm:constr type="t" for="ch" forName="background4"/>
+                                      <dgm:constr type="l" for="ch" forName="background4"/>
+                                      <dgm:constr type="w" for="ch" forName="text4" refType="w" fact="0.9"/>
+                                      <dgm:constr type="h" for="ch" forName="text4" refType="w" refFor="ch" refForName="text4" fact="0.635"/>
+                                      <dgm:constr type="t" for="ch" forName="text4" refType="w" fact="0.095"/>
+                                      <dgm:constr type="l" for="ch" forName="text4" refType="w" fact="0.1"/>
+                                    </dgm:constrLst>
+                                    <dgm:ruleLst/>
+                                    <dgm:layoutNode name="background4" moveWith="text4">
+                                      <dgm:alg type="sp"/>
+                                      <dgm:shape xmlns:r="http://schemas.openxmlformats.org/officeDocument/2006/relationships" type="roundRect" r:blip="">
+                                        <dgm:adjLst>
+                                          <dgm:adj idx="1" val="0.1"/>
+                                        </dgm:adjLst>
+                                      </dgm:shape>
+                                      <dgm:presOf/>
+                                      <dgm:constrLst/>
+                                      <dgm:ruleLst/>
+                                    </dgm:layoutNode>
+                                    <dgm:layoutNode name="text4" styleLbl="fgAcc4">
+                                      <dgm:varLst>
+                                        <dgm:chPref val="3"/>
+                                      </dgm:varLst>
+                                      <dgm:alg type="tx"/>
+                                      <dgm:shape xmlns:r="http://schemas.openxmlformats.org/officeDocument/2006/relationships" type="roundRect" r:blip="">
+                                        <dgm:adjLst>
+                                          <dgm:adj idx="1" val="0.1"/>
+                                        </dgm:adjLst>
+                                      </dgm:shape>
+                                      <dgm:presOf axis="self"/>
+                                      <dgm:constrLst>
+                                        <dgm:constr type="tMarg" refType="primFontSz" fact="0.3"/>
+                                        <dgm:constr type="bMarg" refType="primFontSz" fact="0.3"/>
+                                        <dgm:constr type="lMarg" refType="primFontSz" fact="0.3"/>
+                                        <dgm:constr type="rMarg" refType="primFontSz" fact="0.3"/>
+                                      </dgm:constrLst>
+                                      <dgm:ruleLst>
+                                        <dgm:rule type="primFontSz" val="5" fact="NaN" max="NaN"/>
+                                      </dgm:ruleLst>
+                                    </dgm:layoutNode>
+                                  </dgm:layoutNode>
+                                  <dgm:layoutNode name="hierChild5">
+                                    <dgm:choose name="Name28">
+                                      <dgm:if name="Name29" func="var" arg="dir" op="equ" val="norm">
+                                        <dgm:alg type="hierChild">
+                                          <dgm:param type="linDir" val="fromL"/>
+                                        </dgm:alg>
+                                      </dgm:if>
+                                      <dgm:else name="Name30">
+                                        <dgm:alg type="hierChild">
+                                          <dgm:param type="linDir" val="fromR"/>
+                                        </dgm:alg>
+                                      </dgm:else>
+                                    </dgm:choose>
+                                    <dgm:shape xmlns:r="http://schemas.openxmlformats.org/officeDocument/2006/relationships" r:blip="">
+                                      <dgm:adjLst/>
+                                    </dgm:shape>
+                                    <dgm:presOf/>
+                                    <dgm:constrLst/>
+                                    <dgm:ruleLst/>
+                                    <dgm:forEach name="Name31" ref="repeat"/>
+                                  </dgm:layoutNode>
+                                </dgm:layoutNode>
+                              </dgm:forEach>
+                            </dgm:forEach>
+                          </dgm:layoutNode>
+                        </dgm:layoutNode>
+                      </dgm:forEach>
+                    </dgm:forEach>
+                  </dgm:layoutNode>
+                </dgm:layoutNode>
+              </dgm:forEach>
+            </dgm:forEach>
+          </dgm:layoutNode>
+        </dgm:layoutNode>
+      </dgm:forEach>
+    </dgm:forEach>
+  </dgm:layoutNode>
+</dgm:layoutDef>
+</file>
+
+<file path=ppt/diagrams/layout4.xml><?xml version="1.0" encoding="utf-8"?>
 <dgm:layoutDef xmlns:dgm="http://schemas.openxmlformats.org/drawingml/2006/diagram" xmlns:a="http://schemas.openxmlformats.org/drawingml/2006/main" uniqueId="urn:microsoft.com/office/officeart/2018/2/layout/IconLabelList">
   <dgm:title val="Icon Label List"/>
   <dgm:desc val="Use to show non-sequential or grouped chunks of information accompanied by a related visuals. Works best with icons or small pictures with short text captions."/>
@@ -8680,7 +10684,7 @@
 </dgm:layoutDef>
 </file>
 
-<file path=ppt/diagrams/layout4.xml><?xml version="1.0" encoding="utf-8"?>
+<file path=ppt/diagrams/layout5.xml><?xml version="1.0" encoding="utf-8"?>
 <dgm:layoutDef xmlns:dgm="http://schemas.openxmlformats.org/drawingml/2006/diagram" xmlns:a="http://schemas.openxmlformats.org/drawingml/2006/main" uniqueId="urn:microsoft.com/office/officeart/2016/7/layout/BasicLinearProcessNumbered">
   <dgm:title val="Basic Linear Process Numbered"/>
   <dgm:desc val="Used to show a progression; a timeline; sequential steps in a task, process, or workflow; or to emphasize movement or direction. Automatic numbers have been introduced to show the steps of the process which appears in a circle. Level 1 and Level 2 text appear in a rectangle."/>
@@ -8957,7 +10961,7 @@
 </dgm:layoutDef>
 </file>
 
-<file path=ppt/diagrams/layout5.xml><?xml version="1.0" encoding="utf-8"?>
+<file path=ppt/diagrams/layout6.xml><?xml version="1.0" encoding="utf-8"?>
 <dgm:layoutDef xmlns:dgm="http://schemas.openxmlformats.org/drawingml/2006/diagram" xmlns:a="http://schemas.openxmlformats.org/drawingml/2006/main" uniqueId="urn:microsoft.com/office/officeart/2005/8/layout/bProcess2">
   <dgm:title val=""/>
   <dgm:desc val=""/>
@@ -11336,6 +13340,1040 @@
 </file>
 
 <file path=ppt/diagrams/quickStyle3.xml><?xml version="1.0" encoding="utf-8"?>
+<dgm:styleDef xmlns:dgm="http://schemas.openxmlformats.org/drawingml/2006/diagram" xmlns:a="http://schemas.openxmlformats.org/drawingml/2006/main" uniqueId="urn:microsoft.com/office/officeart/2005/8/quickstyle/simple2">
+  <dgm:title val=""/>
+  <dgm:desc val=""/>
+  <dgm:catLst>
+    <dgm:cat type="simple" pri="10200"/>
+  </dgm:catLst>
+  <dgm:scene3d>
+    <a:camera prst="orthographicFront"/>
+    <a:lightRig rig="threePt" dir="t"/>
+  </dgm:scene3d>
+  <dgm:styleLbl name="node0">
+    <dgm:scene3d>
+      <a:camera prst="orthographicFront"/>
+      <a:lightRig rig="threePt" dir="t"/>
+    </dgm:scene3d>
+    <dgm:sp3d/>
+    <dgm:txPr/>
+    <dgm:style>
+      <a:lnRef idx="3">
+        <a:scrgbClr r="0" g="0" b="0"/>
+      </a:lnRef>
+      <a:fillRef idx="1">
+        <a:scrgbClr r="0" g="0" b="0"/>
+      </a:fillRef>
+      <a:effectRef idx="1">
+        <a:scrgbClr r="0" g="0" b="0"/>
+      </a:effectRef>
+      <a:fontRef idx="minor">
+        <a:schemeClr val="lt1"/>
+      </a:fontRef>
+    </dgm:style>
+  </dgm:styleLbl>
+  <dgm:styleLbl name="lnNode1">
+    <dgm:scene3d>
+      <a:camera prst="orthographicFront"/>
+      <a:lightRig rig="threePt" dir="t"/>
+    </dgm:scene3d>
+    <dgm:sp3d/>
+    <dgm:txPr/>
+    <dgm:style>
+      <a:lnRef idx="3">
+        <a:scrgbClr r="0" g="0" b="0"/>
+      </a:lnRef>
+      <a:fillRef idx="1">
+        <a:scrgbClr r="0" g="0" b="0"/>
+      </a:fillRef>
+      <a:effectRef idx="1">
+        <a:scrgbClr r="0" g="0" b="0"/>
+      </a:effectRef>
+      <a:fontRef idx="minor">
+        <a:schemeClr val="lt1"/>
+      </a:fontRef>
+    </dgm:style>
+  </dgm:styleLbl>
+  <dgm:styleLbl name="vennNode1">
+    <dgm:scene3d>
+      <a:camera prst="orthographicFront"/>
+      <a:lightRig rig="threePt" dir="t"/>
+    </dgm:scene3d>
+    <dgm:sp3d/>
+    <dgm:txPr/>
+    <dgm:style>
+      <a:lnRef idx="3">
+        <a:scrgbClr r="0" g="0" b="0"/>
+      </a:lnRef>
+      <a:fillRef idx="1">
+        <a:scrgbClr r="0" g="0" b="0"/>
+      </a:fillRef>
+      <a:effectRef idx="0">
+        <a:scrgbClr r="0" g="0" b="0"/>
+      </a:effectRef>
+      <a:fontRef idx="minor">
+        <a:schemeClr val="tx1"/>
+      </a:fontRef>
+    </dgm:style>
+  </dgm:styleLbl>
+  <dgm:styleLbl name="alignNode1">
+    <dgm:scene3d>
+      <a:camera prst="orthographicFront"/>
+      <a:lightRig rig="threePt" dir="t"/>
+    </dgm:scene3d>
+    <dgm:sp3d/>
+    <dgm:txPr/>
+    <dgm:style>
+      <a:lnRef idx="2">
+        <a:scrgbClr r="0" g="0" b="0"/>
+      </a:lnRef>
+      <a:fillRef idx="1">
+        <a:scrgbClr r="0" g="0" b="0"/>
+      </a:fillRef>
+      <a:effectRef idx="1">
+        <a:scrgbClr r="0" g="0" b="0"/>
+      </a:effectRef>
+      <a:fontRef idx="minor">
+        <a:schemeClr val="lt1"/>
+      </a:fontRef>
+    </dgm:style>
+  </dgm:styleLbl>
+  <dgm:styleLbl name="node1">
+    <dgm:scene3d>
+      <a:camera prst="orthographicFront"/>
+      <a:lightRig rig="threePt" dir="t"/>
+    </dgm:scene3d>
+    <dgm:sp3d/>
+    <dgm:txPr/>
+    <dgm:style>
+      <a:lnRef idx="3">
+        <a:scrgbClr r="0" g="0" b="0"/>
+      </a:lnRef>
+      <a:fillRef idx="1">
+        <a:scrgbClr r="0" g="0" b="0"/>
+      </a:fillRef>
+      <a:effectRef idx="1">
+        <a:scrgbClr r="0" g="0" b="0"/>
+      </a:effectRef>
+      <a:fontRef idx="minor">
+        <a:schemeClr val="lt1"/>
+      </a:fontRef>
+    </dgm:style>
+  </dgm:styleLbl>
+  <dgm:styleLbl name="node2">
+    <dgm:scene3d>
+      <a:camera prst="orthographicFront"/>
+      <a:lightRig rig="threePt" dir="t"/>
+    </dgm:scene3d>
+    <dgm:sp3d/>
+    <dgm:txPr/>
+    <dgm:style>
+      <a:lnRef idx="3">
+        <a:scrgbClr r="0" g="0" b="0"/>
+      </a:lnRef>
+      <a:fillRef idx="1">
+        <a:scrgbClr r="0" g="0" b="0"/>
+      </a:fillRef>
+      <a:effectRef idx="1">
+        <a:scrgbClr r="0" g="0" b="0"/>
+      </a:effectRef>
+      <a:fontRef idx="minor">
+        <a:schemeClr val="lt1"/>
+      </a:fontRef>
+    </dgm:style>
+  </dgm:styleLbl>
+  <dgm:styleLbl name="node3">
+    <dgm:scene3d>
+      <a:camera prst="orthographicFront"/>
+      <a:lightRig rig="threePt" dir="t"/>
+    </dgm:scene3d>
+    <dgm:sp3d/>
+    <dgm:txPr/>
+    <dgm:style>
+      <a:lnRef idx="3">
+        <a:scrgbClr r="0" g="0" b="0"/>
+      </a:lnRef>
+      <a:fillRef idx="1">
+        <a:scrgbClr r="0" g="0" b="0"/>
+      </a:fillRef>
+      <a:effectRef idx="1">
+        <a:scrgbClr r="0" g="0" b="0"/>
+      </a:effectRef>
+      <a:fontRef idx="minor">
+        <a:schemeClr val="lt1"/>
+      </a:fontRef>
+    </dgm:style>
+  </dgm:styleLbl>
+  <dgm:styleLbl name="node4">
+    <dgm:scene3d>
+      <a:camera prst="orthographicFront"/>
+      <a:lightRig rig="threePt" dir="t"/>
+    </dgm:scene3d>
+    <dgm:sp3d/>
+    <dgm:txPr/>
+    <dgm:style>
+      <a:lnRef idx="3">
+        <a:scrgbClr r="0" g="0" b="0"/>
+      </a:lnRef>
+      <a:fillRef idx="1">
+        <a:scrgbClr r="0" g="0" b="0"/>
+      </a:fillRef>
+      <a:effectRef idx="1">
+        <a:scrgbClr r="0" g="0" b="0"/>
+      </a:effectRef>
+      <a:fontRef idx="minor">
+        <a:schemeClr val="lt1"/>
+      </a:fontRef>
+    </dgm:style>
+  </dgm:styleLbl>
+  <dgm:styleLbl name="fgImgPlace1">
+    <dgm:scene3d>
+      <a:camera prst="orthographicFront"/>
+      <a:lightRig rig="threePt" dir="t"/>
+    </dgm:scene3d>
+    <dgm:sp3d/>
+    <dgm:txPr/>
+    <dgm:style>
+      <a:lnRef idx="3">
+        <a:scrgbClr r="0" g="0" b="0"/>
+      </a:lnRef>
+      <a:fillRef idx="1">
+        <a:scrgbClr r="0" g="0" b="0"/>
+      </a:fillRef>
+      <a:effectRef idx="1">
+        <a:scrgbClr r="0" g="0" b="0"/>
+      </a:effectRef>
+      <a:fontRef idx="minor"/>
+    </dgm:style>
+  </dgm:styleLbl>
+  <dgm:styleLbl name="alignImgPlace1">
+    <dgm:scene3d>
+      <a:camera prst="orthographicFront"/>
+      <a:lightRig rig="threePt" dir="t"/>
+    </dgm:scene3d>
+    <dgm:sp3d/>
+    <dgm:txPr/>
+    <dgm:style>
+      <a:lnRef idx="3">
+        <a:scrgbClr r="0" g="0" b="0"/>
+      </a:lnRef>
+      <a:fillRef idx="1">
+        <a:scrgbClr r="0" g="0" b="0"/>
+      </a:fillRef>
+      <a:effectRef idx="1">
+        <a:scrgbClr r="0" g="0" b="0"/>
+      </a:effectRef>
+      <a:fontRef idx="minor"/>
+    </dgm:style>
+  </dgm:styleLbl>
+  <dgm:styleLbl name="bgImgPlace1">
+    <dgm:scene3d>
+      <a:camera prst="orthographicFront"/>
+      <a:lightRig rig="threePt" dir="t"/>
+    </dgm:scene3d>
+    <dgm:sp3d/>
+    <dgm:txPr/>
+    <dgm:style>
+      <a:lnRef idx="3">
+        <a:scrgbClr r="0" g="0" b="0"/>
+      </a:lnRef>
+      <a:fillRef idx="1">
+        <a:scrgbClr r="0" g="0" b="0"/>
+      </a:fillRef>
+      <a:effectRef idx="1">
+        <a:scrgbClr r="0" g="0" b="0"/>
+      </a:effectRef>
+      <a:fontRef idx="minor"/>
+    </dgm:style>
+  </dgm:styleLbl>
+  <dgm:styleLbl name="sibTrans2D1">
+    <dgm:scene3d>
+      <a:camera prst="orthographicFront"/>
+      <a:lightRig rig="threePt" dir="t"/>
+    </dgm:scene3d>
+    <dgm:sp3d/>
+    <dgm:txPr/>
+    <dgm:style>
+      <a:lnRef idx="0">
+        <a:scrgbClr r="0" g="0" b="0"/>
+      </a:lnRef>
+      <a:fillRef idx="1">
+        <a:scrgbClr r="0" g="0" b="0"/>
+      </a:fillRef>
+      <a:effectRef idx="1">
+        <a:scrgbClr r="0" g="0" b="0"/>
+      </a:effectRef>
+      <a:fontRef idx="minor">
+        <a:schemeClr val="lt1"/>
+      </a:fontRef>
+    </dgm:style>
+  </dgm:styleLbl>
+  <dgm:styleLbl name="fgSibTrans2D1">
+    <dgm:scene3d>
+      <a:camera prst="orthographicFront"/>
+      <a:lightRig rig="threePt" dir="t"/>
+    </dgm:scene3d>
+    <dgm:sp3d/>
+    <dgm:txPr/>
+    <dgm:style>
+      <a:lnRef idx="0">
+        <a:scrgbClr r="0" g="0" b="0"/>
+      </a:lnRef>
+      <a:fillRef idx="1">
+        <a:scrgbClr r="0" g="0" b="0"/>
+      </a:fillRef>
+      <a:effectRef idx="1">
+        <a:scrgbClr r="0" g="0" b="0"/>
+      </a:effectRef>
+      <a:fontRef idx="minor">
+        <a:schemeClr val="lt1"/>
+      </a:fontRef>
+    </dgm:style>
+  </dgm:styleLbl>
+  <dgm:styleLbl name="bgSibTrans2D1">
+    <dgm:scene3d>
+      <a:camera prst="orthographicFront"/>
+      <a:lightRig rig="threePt" dir="t"/>
+    </dgm:scene3d>
+    <dgm:sp3d/>
+    <dgm:txPr/>
+    <dgm:style>
+      <a:lnRef idx="0">
+        <a:scrgbClr r="0" g="0" b="0"/>
+      </a:lnRef>
+      <a:fillRef idx="1">
+        <a:scrgbClr r="0" g="0" b="0"/>
+      </a:fillRef>
+      <a:effectRef idx="1">
+        <a:scrgbClr r="0" g="0" b="0"/>
+      </a:effectRef>
+      <a:fontRef idx="minor">
+        <a:schemeClr val="lt1"/>
+      </a:fontRef>
+    </dgm:style>
+  </dgm:styleLbl>
+  <dgm:styleLbl name="sibTrans1D1">
+    <dgm:scene3d>
+      <a:camera prst="orthographicFront"/>
+      <a:lightRig rig="threePt" dir="t"/>
+    </dgm:scene3d>
+    <dgm:sp3d/>
+    <dgm:txPr/>
+    <dgm:style>
+      <a:lnRef idx="1">
+        <a:scrgbClr r="0" g="0" b="0"/>
+      </a:lnRef>
+      <a:fillRef idx="0">
+        <a:scrgbClr r="0" g="0" b="0"/>
+      </a:fillRef>
+      <a:effectRef idx="0">
+        <a:scrgbClr r="0" g="0" b="0"/>
+      </a:effectRef>
+      <a:fontRef idx="minor"/>
+    </dgm:style>
+  </dgm:styleLbl>
+  <dgm:styleLbl name="callout">
+    <dgm:scene3d>
+      <a:camera prst="orthographicFront"/>
+      <a:lightRig rig="threePt" dir="t"/>
+    </dgm:scene3d>
+    <dgm:sp3d/>
+    <dgm:txPr/>
+    <dgm:style>
+      <a:lnRef idx="2">
+        <a:scrgbClr r="0" g="0" b="0"/>
+      </a:lnRef>
+      <a:fillRef idx="1">
+        <a:scrgbClr r="0" g="0" b="0"/>
+      </a:fillRef>
+      <a:effectRef idx="1">
+        <a:scrgbClr r="0" g="0" b="0"/>
+      </a:effectRef>
+      <a:fontRef idx="minor"/>
+    </dgm:style>
+  </dgm:styleLbl>
+  <dgm:styleLbl name="asst0">
+    <dgm:scene3d>
+      <a:camera prst="orthographicFront"/>
+      <a:lightRig rig="threePt" dir="t"/>
+    </dgm:scene3d>
+    <dgm:sp3d/>
+    <dgm:txPr/>
+    <dgm:style>
+      <a:lnRef idx="3">
+        <a:scrgbClr r="0" g="0" b="0"/>
+      </a:lnRef>
+      <a:fillRef idx="1">
+        <a:scrgbClr r="0" g="0" b="0"/>
+      </a:fillRef>
+      <a:effectRef idx="1">
+        <a:scrgbClr r="0" g="0" b="0"/>
+      </a:effectRef>
+      <a:fontRef idx="minor">
+        <a:schemeClr val="lt1"/>
+      </a:fontRef>
+    </dgm:style>
+  </dgm:styleLbl>
+  <dgm:styleLbl name="asst1">
+    <dgm:scene3d>
+      <a:camera prst="orthographicFront"/>
+      <a:lightRig rig="threePt" dir="t"/>
+    </dgm:scene3d>
+    <dgm:sp3d/>
+    <dgm:txPr/>
+    <dgm:style>
+      <a:lnRef idx="3">
+        <a:scrgbClr r="0" g="0" b="0"/>
+      </a:lnRef>
+      <a:fillRef idx="1">
+        <a:scrgbClr r="0" g="0" b="0"/>
+      </a:fillRef>
+      <a:effectRef idx="1">
+        <a:scrgbClr r="0" g="0" b="0"/>
+      </a:effectRef>
+      <a:fontRef idx="minor">
+        <a:schemeClr val="lt1"/>
+      </a:fontRef>
+    </dgm:style>
+  </dgm:styleLbl>
+  <dgm:styleLbl name="asst2">
+    <dgm:scene3d>
+      <a:camera prst="orthographicFront"/>
+      <a:lightRig rig="threePt" dir="t"/>
+    </dgm:scene3d>
+    <dgm:sp3d/>
+    <dgm:txPr/>
+    <dgm:style>
+      <a:lnRef idx="3">
+        <a:scrgbClr r="0" g="0" b="0"/>
+      </a:lnRef>
+      <a:fillRef idx="1">
+        <a:scrgbClr r="0" g="0" b="0"/>
+      </a:fillRef>
+      <a:effectRef idx="1">
+        <a:scrgbClr r="0" g="0" b="0"/>
+      </a:effectRef>
+      <a:fontRef idx="minor">
+        <a:schemeClr val="lt1"/>
+      </a:fontRef>
+    </dgm:style>
+  </dgm:styleLbl>
+  <dgm:styleLbl name="asst3">
+    <dgm:scene3d>
+      <a:camera prst="orthographicFront"/>
+      <a:lightRig rig="threePt" dir="t"/>
+    </dgm:scene3d>
+    <dgm:sp3d/>
+    <dgm:txPr/>
+    <dgm:style>
+      <a:lnRef idx="3">
+        <a:scrgbClr r="0" g="0" b="0"/>
+      </a:lnRef>
+      <a:fillRef idx="1">
+        <a:scrgbClr r="0" g="0" b="0"/>
+      </a:fillRef>
+      <a:effectRef idx="1">
+        <a:scrgbClr r="0" g="0" b="0"/>
+      </a:effectRef>
+      <a:fontRef idx="minor">
+        <a:schemeClr val="lt1"/>
+      </a:fontRef>
+    </dgm:style>
+  </dgm:styleLbl>
+  <dgm:styleLbl name="asst4">
+    <dgm:scene3d>
+      <a:camera prst="orthographicFront"/>
+      <a:lightRig rig="threePt" dir="t"/>
+    </dgm:scene3d>
+    <dgm:sp3d/>
+    <dgm:txPr/>
+    <dgm:style>
+      <a:lnRef idx="3">
+        <a:scrgbClr r="0" g="0" b="0"/>
+      </a:lnRef>
+      <a:fillRef idx="1">
+        <a:scrgbClr r="0" g="0" b="0"/>
+      </a:fillRef>
+      <a:effectRef idx="1">
+        <a:scrgbClr r="0" g="0" b="0"/>
+      </a:effectRef>
+      <a:fontRef idx="minor">
+        <a:schemeClr val="lt1"/>
+      </a:fontRef>
+    </dgm:style>
+  </dgm:styleLbl>
+  <dgm:styleLbl name="parChTrans2D1">
+    <dgm:scene3d>
+      <a:camera prst="orthographicFront"/>
+      <a:lightRig rig="threePt" dir="t"/>
+    </dgm:scene3d>
+    <dgm:sp3d/>
+    <dgm:txPr/>
+    <dgm:style>
+      <a:lnRef idx="3">
+        <a:scrgbClr r="0" g="0" b="0"/>
+      </a:lnRef>
+      <a:fillRef idx="1">
+        <a:scrgbClr r="0" g="0" b="0"/>
+      </a:fillRef>
+      <a:effectRef idx="1">
+        <a:scrgbClr r="0" g="0" b="0"/>
+      </a:effectRef>
+      <a:fontRef idx="minor">
+        <a:schemeClr val="lt1"/>
+      </a:fontRef>
+    </dgm:style>
+  </dgm:styleLbl>
+  <dgm:styleLbl name="parChTrans2D2">
+    <dgm:scene3d>
+      <a:camera prst="orthographicFront"/>
+      <a:lightRig rig="threePt" dir="t"/>
+    </dgm:scene3d>
+    <dgm:sp3d/>
+    <dgm:txPr/>
+    <dgm:style>
+      <a:lnRef idx="3">
+        <a:scrgbClr r="0" g="0" b="0"/>
+      </a:lnRef>
+      <a:fillRef idx="1">
+        <a:scrgbClr r="0" g="0" b="0"/>
+      </a:fillRef>
+      <a:effectRef idx="1">
+        <a:scrgbClr r="0" g="0" b="0"/>
+      </a:effectRef>
+      <a:fontRef idx="minor">
+        <a:schemeClr val="lt1"/>
+      </a:fontRef>
+    </dgm:style>
+  </dgm:styleLbl>
+  <dgm:styleLbl name="parChTrans2D3">
+    <dgm:scene3d>
+      <a:camera prst="orthographicFront"/>
+      <a:lightRig rig="threePt" dir="t"/>
+    </dgm:scene3d>
+    <dgm:sp3d/>
+    <dgm:txPr/>
+    <dgm:style>
+      <a:lnRef idx="3">
+        <a:scrgbClr r="0" g="0" b="0"/>
+      </a:lnRef>
+      <a:fillRef idx="1">
+        <a:scrgbClr r="0" g="0" b="0"/>
+      </a:fillRef>
+      <a:effectRef idx="1">
+        <a:scrgbClr r="0" g="0" b="0"/>
+      </a:effectRef>
+      <a:fontRef idx="minor">
+        <a:schemeClr val="lt1"/>
+      </a:fontRef>
+    </dgm:style>
+  </dgm:styleLbl>
+  <dgm:styleLbl name="parChTrans2D4">
+    <dgm:scene3d>
+      <a:camera prst="orthographicFront"/>
+      <a:lightRig rig="threePt" dir="t"/>
+    </dgm:scene3d>
+    <dgm:sp3d/>
+    <dgm:txPr/>
+    <dgm:style>
+      <a:lnRef idx="3">
+        <a:scrgbClr r="0" g="0" b="0"/>
+      </a:lnRef>
+      <a:fillRef idx="1">
+        <a:scrgbClr r="0" g="0" b="0"/>
+      </a:fillRef>
+      <a:effectRef idx="1">
+        <a:scrgbClr r="0" g="0" b="0"/>
+      </a:effectRef>
+      <a:fontRef idx="minor">
+        <a:schemeClr val="lt1"/>
+      </a:fontRef>
+    </dgm:style>
+  </dgm:styleLbl>
+  <dgm:styleLbl name="parChTrans1D1">
+    <dgm:scene3d>
+      <a:camera prst="orthographicFront"/>
+      <a:lightRig rig="threePt" dir="t"/>
+    </dgm:scene3d>
+    <dgm:sp3d/>
+    <dgm:txPr/>
+    <dgm:style>
+      <a:lnRef idx="2">
+        <a:scrgbClr r="0" g="0" b="0"/>
+      </a:lnRef>
+      <a:fillRef idx="0">
+        <a:scrgbClr r="0" g="0" b="0"/>
+      </a:fillRef>
+      <a:effectRef idx="0">
+        <a:scrgbClr r="0" g="0" b="0"/>
+      </a:effectRef>
+      <a:fontRef idx="minor"/>
+    </dgm:style>
+  </dgm:styleLbl>
+  <dgm:styleLbl name="parChTrans1D2">
+    <dgm:scene3d>
+      <a:camera prst="orthographicFront"/>
+      <a:lightRig rig="threePt" dir="t"/>
+    </dgm:scene3d>
+    <dgm:sp3d/>
+    <dgm:txPr/>
+    <dgm:style>
+      <a:lnRef idx="2">
+        <a:scrgbClr r="0" g="0" b="0"/>
+      </a:lnRef>
+      <a:fillRef idx="0">
+        <a:scrgbClr r="0" g="0" b="0"/>
+      </a:fillRef>
+      <a:effectRef idx="0">
+        <a:scrgbClr r="0" g="0" b="0"/>
+      </a:effectRef>
+      <a:fontRef idx="minor"/>
+    </dgm:style>
+  </dgm:styleLbl>
+  <dgm:styleLbl name="parChTrans1D3">
+    <dgm:scene3d>
+      <a:camera prst="orthographicFront"/>
+      <a:lightRig rig="threePt" dir="t"/>
+    </dgm:scene3d>
+    <dgm:sp3d/>
+    <dgm:txPr/>
+    <dgm:style>
+      <a:lnRef idx="2">
+        <a:scrgbClr r="0" g="0" b="0"/>
+      </a:lnRef>
+      <a:fillRef idx="0">
+        <a:scrgbClr r="0" g="0" b="0"/>
+      </a:fillRef>
+      <a:effectRef idx="0">
+        <a:scrgbClr r="0" g="0" b="0"/>
+      </a:effectRef>
+      <a:fontRef idx="minor"/>
+    </dgm:style>
+  </dgm:styleLbl>
+  <dgm:styleLbl name="parChTrans1D4">
+    <dgm:scene3d>
+      <a:camera prst="orthographicFront"/>
+      <a:lightRig rig="threePt" dir="t"/>
+    </dgm:scene3d>
+    <dgm:sp3d/>
+    <dgm:txPr/>
+    <dgm:style>
+      <a:lnRef idx="2">
+        <a:scrgbClr r="0" g="0" b="0"/>
+      </a:lnRef>
+      <a:fillRef idx="0">
+        <a:scrgbClr r="0" g="0" b="0"/>
+      </a:fillRef>
+      <a:effectRef idx="0">
+        <a:scrgbClr r="0" g="0" b="0"/>
+      </a:effectRef>
+      <a:fontRef idx="minor"/>
+    </dgm:style>
+  </dgm:styleLbl>
+  <dgm:styleLbl name="fgAcc1">
+    <dgm:scene3d>
+      <a:camera prst="orthographicFront"/>
+      <a:lightRig rig="threePt" dir="t"/>
+    </dgm:scene3d>
+    <dgm:sp3d/>
+    <dgm:txPr/>
+    <dgm:style>
+      <a:lnRef idx="2">
+        <a:scrgbClr r="0" g="0" b="0"/>
+      </a:lnRef>
+      <a:fillRef idx="1">
+        <a:scrgbClr r="0" g="0" b="0"/>
+      </a:fillRef>
+      <a:effectRef idx="0">
+        <a:scrgbClr r="0" g="0" b="0"/>
+      </a:effectRef>
+      <a:fontRef idx="minor"/>
+    </dgm:style>
+  </dgm:styleLbl>
+  <dgm:styleLbl name="conFgAcc1">
+    <dgm:scene3d>
+      <a:camera prst="orthographicFront"/>
+      <a:lightRig rig="threePt" dir="t"/>
+    </dgm:scene3d>
+    <dgm:sp3d/>
+    <dgm:txPr/>
+    <dgm:style>
+      <a:lnRef idx="2">
+        <a:scrgbClr r="0" g="0" b="0"/>
+      </a:lnRef>
+      <a:fillRef idx="1">
+        <a:scrgbClr r="0" g="0" b="0"/>
+      </a:fillRef>
+      <a:effectRef idx="0">
+        <a:scrgbClr r="0" g="0" b="0"/>
+      </a:effectRef>
+      <a:fontRef idx="minor"/>
+    </dgm:style>
+  </dgm:styleLbl>
+  <dgm:styleLbl name="alignAcc1">
+    <dgm:scene3d>
+      <a:camera prst="orthographicFront"/>
+      <a:lightRig rig="threePt" dir="t"/>
+    </dgm:scene3d>
+    <dgm:sp3d/>
+    <dgm:txPr/>
+    <dgm:style>
+      <a:lnRef idx="2">
+        <a:scrgbClr r="0" g="0" b="0"/>
+      </a:lnRef>
+      <a:fillRef idx="1">
+        <a:scrgbClr r="0" g="0" b="0"/>
+      </a:fillRef>
+      <a:effectRef idx="0">
+        <a:scrgbClr r="0" g="0" b="0"/>
+      </a:effectRef>
+      <a:fontRef idx="minor"/>
+    </dgm:style>
+  </dgm:styleLbl>
+  <dgm:styleLbl name="trAlignAcc1">
+    <dgm:scene3d>
+      <a:camera prst="orthographicFront"/>
+      <a:lightRig rig="threePt" dir="t"/>
+    </dgm:scene3d>
+    <dgm:sp3d/>
+    <dgm:txPr/>
+    <dgm:style>
+      <a:lnRef idx="1">
+        <a:scrgbClr r="0" g="0" b="0"/>
+      </a:lnRef>
+      <a:fillRef idx="1">
+        <a:scrgbClr r="0" g="0" b="0"/>
+      </a:fillRef>
+      <a:effectRef idx="0">
+        <a:scrgbClr r="0" g="0" b="0"/>
+      </a:effectRef>
+      <a:fontRef idx="minor"/>
+    </dgm:style>
+  </dgm:styleLbl>
+  <dgm:styleLbl name="bgAcc1">
+    <dgm:scene3d>
+      <a:camera prst="orthographicFront"/>
+      <a:lightRig rig="threePt" dir="t"/>
+    </dgm:scene3d>
+    <dgm:sp3d/>
+    <dgm:txPr/>
+    <dgm:style>
+      <a:lnRef idx="2">
+        <a:scrgbClr r="0" g="0" b="0"/>
+      </a:lnRef>
+      <a:fillRef idx="1">
+        <a:scrgbClr r="0" g="0" b="0"/>
+      </a:fillRef>
+      <a:effectRef idx="0">
+        <a:scrgbClr r="0" g="0" b="0"/>
+      </a:effectRef>
+      <a:fontRef idx="minor"/>
+    </dgm:style>
+  </dgm:styleLbl>
+  <dgm:styleLbl name="solidFgAcc1">
+    <dgm:scene3d>
+      <a:camera prst="orthographicFront"/>
+      <a:lightRig rig="threePt" dir="t"/>
+    </dgm:scene3d>
+    <dgm:sp3d/>
+    <dgm:txPr/>
+    <dgm:style>
+      <a:lnRef idx="2">
+        <a:scrgbClr r="0" g="0" b="0"/>
+      </a:lnRef>
+      <a:fillRef idx="1">
+        <a:scrgbClr r="0" g="0" b="0"/>
+      </a:fillRef>
+      <a:effectRef idx="0">
+        <a:scrgbClr r="0" g="0" b="0"/>
+      </a:effectRef>
+      <a:fontRef idx="minor"/>
+    </dgm:style>
+  </dgm:styleLbl>
+  <dgm:styleLbl name="solidAlignAcc1">
+    <dgm:scene3d>
+      <a:camera prst="orthographicFront"/>
+      <a:lightRig rig="threePt" dir="t"/>
+    </dgm:scene3d>
+    <dgm:sp3d/>
+    <dgm:txPr/>
+    <dgm:style>
+      <a:lnRef idx="2">
+        <a:scrgbClr r="0" g="0" b="0"/>
+      </a:lnRef>
+      <a:fillRef idx="1">
+        <a:scrgbClr r="0" g="0" b="0"/>
+      </a:fillRef>
+      <a:effectRef idx="0">
+        <a:scrgbClr r="0" g="0" b="0"/>
+      </a:effectRef>
+      <a:fontRef idx="minor"/>
+    </dgm:style>
+  </dgm:styleLbl>
+  <dgm:styleLbl name="solidBgAcc1">
+    <dgm:scene3d>
+      <a:camera prst="orthographicFront"/>
+      <a:lightRig rig="threePt" dir="t"/>
+    </dgm:scene3d>
+    <dgm:sp3d/>
+    <dgm:txPr/>
+    <dgm:style>
+      <a:lnRef idx="2">
+        <a:scrgbClr r="0" g="0" b="0"/>
+      </a:lnRef>
+      <a:fillRef idx="1">
+        <a:scrgbClr r="0" g="0" b="0"/>
+      </a:fillRef>
+      <a:effectRef idx="0">
+        <a:scrgbClr r="0" g="0" b="0"/>
+      </a:effectRef>
+      <a:fontRef idx="minor"/>
+    </dgm:style>
+  </dgm:styleLbl>
+  <dgm:styleLbl name="fgAccFollowNode1">
+    <dgm:scene3d>
+      <a:camera prst="orthographicFront"/>
+      <a:lightRig rig="threePt" dir="t"/>
+    </dgm:scene3d>
+    <dgm:sp3d/>
+    <dgm:txPr/>
+    <dgm:style>
+      <a:lnRef idx="2">
+        <a:scrgbClr r="0" g="0" b="0"/>
+      </a:lnRef>
+      <a:fillRef idx="1">
+        <a:scrgbClr r="0" g="0" b="0"/>
+      </a:fillRef>
+      <a:effectRef idx="0">
+        <a:scrgbClr r="0" g="0" b="0"/>
+      </a:effectRef>
+      <a:fontRef idx="minor"/>
+    </dgm:style>
+  </dgm:styleLbl>
+  <dgm:styleLbl name="alignAccFollowNode1">
+    <dgm:scene3d>
+      <a:camera prst="orthographicFront"/>
+      <a:lightRig rig="threePt" dir="t"/>
+    </dgm:scene3d>
+    <dgm:sp3d/>
+    <dgm:txPr/>
+    <dgm:style>
+      <a:lnRef idx="2">
+        <a:scrgbClr r="0" g="0" b="0"/>
+      </a:lnRef>
+      <a:fillRef idx="1">
+        <a:scrgbClr r="0" g="0" b="0"/>
+      </a:fillRef>
+      <a:effectRef idx="0">
+        <a:scrgbClr r="0" g="0" b="0"/>
+      </a:effectRef>
+      <a:fontRef idx="minor"/>
+    </dgm:style>
+  </dgm:styleLbl>
+  <dgm:styleLbl name="bgAccFollowNode1">
+    <dgm:scene3d>
+      <a:camera prst="orthographicFront"/>
+      <a:lightRig rig="threePt" dir="t"/>
+    </dgm:scene3d>
+    <dgm:sp3d/>
+    <dgm:txPr/>
+    <dgm:style>
+      <a:lnRef idx="2">
+        <a:scrgbClr r="0" g="0" b="0"/>
+      </a:lnRef>
+      <a:fillRef idx="1">
+        <a:scrgbClr r="0" g="0" b="0"/>
+      </a:fillRef>
+      <a:effectRef idx="0">
+        <a:scrgbClr r="0" g="0" b="0"/>
+      </a:effectRef>
+      <a:fontRef idx="minor"/>
+    </dgm:style>
+  </dgm:styleLbl>
+  <dgm:styleLbl name="fgAcc0">
+    <dgm:scene3d>
+      <a:camera prst="orthographicFront"/>
+      <a:lightRig rig="threePt" dir="t"/>
+    </dgm:scene3d>
+    <dgm:sp3d/>
+    <dgm:txPr/>
+    <dgm:style>
+      <a:lnRef idx="2">
+        <a:scrgbClr r="0" g="0" b="0"/>
+      </a:lnRef>
+      <a:fillRef idx="1">
+        <a:scrgbClr r="0" g="0" b="0"/>
+      </a:fillRef>
+      <a:effectRef idx="0">
+        <a:scrgbClr r="0" g="0" b="0"/>
+      </a:effectRef>
+      <a:fontRef idx="minor"/>
+    </dgm:style>
+  </dgm:styleLbl>
+  <dgm:styleLbl name="fgAcc2">
+    <dgm:scene3d>
+      <a:camera prst="orthographicFront"/>
+      <a:lightRig rig="threePt" dir="t"/>
+    </dgm:scene3d>
+    <dgm:sp3d/>
+    <dgm:txPr/>
+    <dgm:style>
+      <a:lnRef idx="2">
+        <a:scrgbClr r="0" g="0" b="0"/>
+      </a:lnRef>
+      <a:fillRef idx="1">
+        <a:scrgbClr r="0" g="0" b="0"/>
+      </a:fillRef>
+      <a:effectRef idx="0">
+        <a:scrgbClr r="0" g="0" b="0"/>
+      </a:effectRef>
+      <a:fontRef idx="minor"/>
+    </dgm:style>
+  </dgm:styleLbl>
+  <dgm:styleLbl name="fgAcc3">
+    <dgm:scene3d>
+      <a:camera prst="orthographicFront"/>
+      <a:lightRig rig="threePt" dir="t"/>
+    </dgm:scene3d>
+    <dgm:sp3d/>
+    <dgm:txPr/>
+    <dgm:style>
+      <a:lnRef idx="2">
+        <a:scrgbClr r="0" g="0" b="0"/>
+      </a:lnRef>
+      <a:fillRef idx="1">
+        <a:scrgbClr r="0" g="0" b="0"/>
+      </a:fillRef>
+      <a:effectRef idx="0">
+        <a:scrgbClr r="0" g="0" b="0"/>
+      </a:effectRef>
+      <a:fontRef idx="minor"/>
+    </dgm:style>
+  </dgm:styleLbl>
+  <dgm:styleLbl name="fgAcc4">
+    <dgm:scene3d>
+      <a:camera prst="orthographicFront"/>
+      <a:lightRig rig="threePt" dir="t"/>
+    </dgm:scene3d>
+    <dgm:sp3d/>
+    <dgm:txPr/>
+    <dgm:style>
+      <a:lnRef idx="2">
+        <a:scrgbClr r="0" g="0" b="0"/>
+      </a:lnRef>
+      <a:fillRef idx="1">
+        <a:scrgbClr r="0" g="0" b="0"/>
+      </a:fillRef>
+      <a:effectRef idx="0">
+        <a:scrgbClr r="0" g="0" b="0"/>
+      </a:effectRef>
+      <a:fontRef idx="minor"/>
+    </dgm:style>
+  </dgm:styleLbl>
+  <dgm:styleLbl name="bgShp">
+    <dgm:scene3d>
+      <a:camera prst="orthographicFront"/>
+      <a:lightRig rig="threePt" dir="t"/>
+    </dgm:scene3d>
+    <dgm:sp3d/>
+    <dgm:txPr/>
+    <dgm:style>
+      <a:lnRef idx="0">
+        <a:scrgbClr r="0" g="0" b="0"/>
+      </a:lnRef>
+      <a:fillRef idx="1">
+        <a:scrgbClr r="0" g="0" b="0"/>
+      </a:fillRef>
+      <a:effectRef idx="0">
+        <a:scrgbClr r="0" g="0" b="0"/>
+      </a:effectRef>
+      <a:fontRef idx="minor"/>
+    </dgm:style>
+  </dgm:styleLbl>
+  <dgm:styleLbl name="dkBgShp">
+    <dgm:scene3d>
+      <a:camera prst="orthographicFront"/>
+      <a:lightRig rig="threePt" dir="t"/>
+    </dgm:scene3d>
+    <dgm:sp3d/>
+    <dgm:txPr/>
+    <dgm:style>
+      <a:lnRef idx="0">
+        <a:scrgbClr r="0" g="0" b="0"/>
+      </a:lnRef>
+      <a:fillRef idx="1">
+        <a:scrgbClr r="0" g="0" b="0"/>
+      </a:fillRef>
+      <a:effectRef idx="0">
+        <a:scrgbClr r="0" g="0" b="0"/>
+      </a:effectRef>
+      <a:fontRef idx="minor"/>
+    </dgm:style>
+  </dgm:styleLbl>
+  <dgm:styleLbl name="trBgShp">
+    <dgm:scene3d>
+      <a:camera prst="orthographicFront"/>
+      <a:lightRig rig="threePt" dir="t"/>
+    </dgm:scene3d>
+    <dgm:sp3d/>
+    <dgm:txPr/>
+    <dgm:style>
+      <a:lnRef idx="0">
+        <a:scrgbClr r="0" g="0" b="0"/>
+      </a:lnRef>
+      <a:fillRef idx="1">
+        <a:scrgbClr r="0" g="0" b="0"/>
+      </a:fillRef>
+      <a:effectRef idx="0">
+        <a:scrgbClr r="0" g="0" b="0"/>
+      </a:effectRef>
+      <a:fontRef idx="minor"/>
+    </dgm:style>
+  </dgm:styleLbl>
+  <dgm:styleLbl name="fgShp">
+    <dgm:scene3d>
+      <a:camera prst="orthographicFront"/>
+      <a:lightRig rig="threePt" dir="t"/>
+    </dgm:scene3d>
+    <dgm:sp3d/>
+    <dgm:txPr/>
+    <dgm:style>
+      <a:lnRef idx="3">
+        <a:scrgbClr r="0" g="0" b="0"/>
+      </a:lnRef>
+      <a:fillRef idx="1">
+        <a:scrgbClr r="0" g="0" b="0"/>
+      </a:fillRef>
+      <a:effectRef idx="1">
+        <a:scrgbClr r="0" g="0" b="0"/>
+      </a:effectRef>
+      <a:fontRef idx="minor"/>
+    </dgm:style>
+  </dgm:styleLbl>
+  <dgm:styleLbl name="revTx">
+    <dgm:scene3d>
+      <a:camera prst="orthographicFront"/>
+      <a:lightRig rig="threePt" dir="t"/>
+    </dgm:scene3d>
+    <dgm:sp3d/>
+    <dgm:txPr/>
+    <dgm:style>
+      <a:lnRef idx="0">
+        <a:scrgbClr r="0" g="0" b="0"/>
+      </a:lnRef>
+      <a:fillRef idx="0">
+        <a:scrgbClr r="0" g="0" b="0"/>
+      </a:fillRef>
+      <a:effectRef idx="0">
+        <a:scrgbClr r="0" g="0" b="0"/>
+      </a:effectRef>
+      <a:fontRef idx="minor"/>
+    </dgm:style>
+  </dgm:styleLbl>
+</dgm:styleDef>
+</file>
+
+<file path=ppt/diagrams/quickStyle4.xml><?xml version="1.0" encoding="utf-8"?>
 <dgm:styleDef xmlns:dgm="http://schemas.openxmlformats.org/drawingml/2006/diagram" xmlns:a="http://schemas.openxmlformats.org/drawingml/2006/main" uniqueId="urn:microsoft.com/office/officeart/2005/8/quickstyle/simple4">
   <dgm:title val=""/>
   <dgm:desc val=""/>
@@ -12369,7 +15407,7 @@
 </dgm:styleDef>
 </file>
 
-<file path=ppt/diagrams/quickStyle4.xml><?xml version="1.0" encoding="utf-8"?>
+<file path=ppt/diagrams/quickStyle5.xml><?xml version="1.0" encoding="utf-8"?>
 <dgm:styleDef xmlns:dgm="http://schemas.openxmlformats.org/drawingml/2006/diagram" xmlns:a="http://schemas.openxmlformats.org/drawingml/2006/main" uniqueId="urn:microsoft.com/office/officeart/2005/8/quickstyle/simple1">
   <dgm:title val=""/>
   <dgm:desc val=""/>
@@ -13403,7 +16441,7 @@
 </dgm:styleDef>
 </file>
 
-<file path=ppt/diagrams/quickStyle5.xml><?xml version="1.0" encoding="utf-8"?>
+<file path=ppt/diagrams/quickStyle6.xml><?xml version="1.0" encoding="utf-8"?>
 <dgm:styleDef xmlns:dgm="http://schemas.openxmlformats.org/drawingml/2006/diagram" xmlns:a="http://schemas.openxmlformats.org/drawingml/2006/main" uniqueId="urn:microsoft.com/office/officeart/2005/8/quickstyle/simple1">
   <dgm:title val=""/>
   <dgm:desc val=""/>
@@ -22963,6 +26001,826 @@
           <a:chExt cx="0" cy="0"/>
         </a:xfrm>
       </p:grpSpPr>
+      <p:sp useBgFill="1">
+        <p:nvSpPr>
+          <p:cNvPr id="16" name="Rectangle 12">
+            <a:extLst>
+              <a:ext uri="{FF2B5EF4-FFF2-40B4-BE49-F238E27FC236}">
+                <a16:creationId xmlns:a16="http://schemas.microsoft.com/office/drawing/2014/main" id="{3F4C104D-5F30-4811-9376-566B26E4719A}"/>
+              </a:ext>
+              <a:ext uri="{C183D7F6-B498-43B3-948B-1728B52AA6E4}">
+                <adec:decorative xmlns:adec="http://schemas.microsoft.com/office/drawing/2017/decorative" val="1"/>
+              </a:ext>
+            </a:extLst>
+          </p:cNvPr>
+          <p:cNvSpPr>
+            <a:spLocks noGrp="1" noRot="1" noChangeAspect="1" noMove="1" noResize="1" noEditPoints="1" noAdjustHandles="1" noChangeArrowheads="1" noChangeShapeType="1" noTextEdit="1"/>
+          </p:cNvSpPr>
+          <p:nvPr>
+            <p:extLst>
+              <p:ext uri="{386F3935-93C4-4BCD-93E2-E3B085C9AB24}">
+                <p16:designElem xmlns:p16="http://schemas.microsoft.com/office/powerpoint/2015/main" val="1"/>
+              </p:ext>
+            </p:extLst>
+          </p:nvPr>
+        </p:nvSpPr>
+        <p:spPr>
+          <a:xfrm>
+            <a:off x="0" y="-786"/>
+            <a:ext cx="12192000" cy="6854038"/>
+          </a:xfrm>
+          <a:prstGeom prst="rect">
+            <a:avLst/>
+          </a:prstGeom>
+          <a:ln>
+            <a:noFill/>
+          </a:ln>
+        </p:spPr>
+        <p:style>
+          <a:lnRef idx="2">
+            <a:schemeClr val="accent1">
+              <a:shade val="50000"/>
+            </a:schemeClr>
+          </a:lnRef>
+          <a:fillRef idx="1">
+            <a:schemeClr val="accent1"/>
+          </a:fillRef>
+          <a:effectRef idx="0">
+            <a:schemeClr val="accent1"/>
+          </a:effectRef>
+          <a:fontRef idx="minor">
+            <a:schemeClr val="lt1"/>
+          </a:fontRef>
+        </p:style>
+        <p:txBody>
+          <a:bodyPr rtlCol="0" anchor="ctr"/>
+          <a:lstStyle/>
+          <a:p>
+            <a:pPr algn="ctr"/>
+            <a:endParaRPr lang="en-US"/>
+          </a:p>
+        </p:txBody>
+      </p:sp>
+      <p:sp>
+        <p:nvSpPr>
+          <p:cNvPr id="2" name="Title 1">
+            <a:extLst>
+              <a:ext uri="{FF2B5EF4-FFF2-40B4-BE49-F238E27FC236}">
+                <a16:creationId xmlns:a16="http://schemas.microsoft.com/office/drawing/2014/main" id="{1B199E50-EA59-394F-98E7-CEA7947E1B1C}"/>
+              </a:ext>
+            </a:extLst>
+          </p:cNvPr>
+          <p:cNvSpPr>
+            <a:spLocks noGrp="1"/>
+          </p:cNvSpPr>
+          <p:nvPr>
+            <p:ph type="title"/>
+          </p:nvPr>
+        </p:nvSpPr>
+        <p:spPr>
+          <a:xfrm>
+            <a:off x="649224" y="645106"/>
+            <a:ext cx="3650279" cy="1259894"/>
+          </a:xfrm>
+        </p:spPr>
+        <p:txBody>
+          <a:bodyPr>
+            <a:normAutofit/>
+          </a:bodyPr>
+          <a:lstStyle/>
+          <a:p>
+            <a:endParaRPr lang="en-US" dirty="0"/>
+          </a:p>
+        </p:txBody>
+      </p:sp>
+      <p:sp>
+        <p:nvSpPr>
+          <p:cNvPr id="15" name="Rectangle 14">
+            <a:extLst>
+              <a:ext uri="{FF2B5EF4-FFF2-40B4-BE49-F238E27FC236}">
+                <a16:creationId xmlns:a16="http://schemas.microsoft.com/office/drawing/2014/main" id="{0815E34B-5D02-4E01-A936-E8E1C0AB6F12}"/>
+              </a:ext>
+              <a:ext uri="{C183D7F6-B498-43B3-948B-1728B52AA6E4}">
+                <adec:decorative xmlns:adec="http://schemas.microsoft.com/office/drawing/2017/decorative" val="1"/>
+              </a:ext>
+            </a:extLst>
+          </p:cNvPr>
+          <p:cNvSpPr>
+            <a:spLocks noGrp="1" noRot="1" noChangeAspect="1" noMove="1" noResize="1" noEditPoints="1" noAdjustHandles="1" noChangeArrowheads="1" noChangeShapeType="1" noTextEdit="1"/>
+          </p:cNvSpPr>
+          <p:nvPr>
+            <p:extLst>
+              <p:ext uri="{386F3935-93C4-4BCD-93E2-E3B085C9AB24}">
+                <p16:designElem xmlns:p16="http://schemas.microsoft.com/office/powerpoint/2015/main" val="1"/>
+              </p:ext>
+            </p:extLst>
+          </p:nvPr>
+        </p:nvSpPr>
+        <p:spPr>
+          <a:xfrm>
+            <a:off x="0" y="0"/>
+            <a:ext cx="182880" cy="6858000"/>
+          </a:xfrm>
+          <a:prstGeom prst="rect">
+            <a:avLst/>
+          </a:prstGeom>
+          <a:solidFill>
+            <a:schemeClr val="tx2"/>
+          </a:solidFill>
+          <a:ln>
+            <a:noFill/>
+          </a:ln>
+          <a:effectLst/>
+        </p:spPr>
+        <p:style>
+          <a:lnRef idx="1">
+            <a:schemeClr val="accent1"/>
+          </a:lnRef>
+          <a:fillRef idx="3">
+            <a:schemeClr val="accent1"/>
+          </a:fillRef>
+          <a:effectRef idx="2">
+            <a:schemeClr val="accent1"/>
+          </a:effectRef>
+          <a:fontRef idx="minor">
+            <a:schemeClr val="lt1"/>
+          </a:fontRef>
+        </p:style>
+      </p:sp>
+      <p:sp>
+        <p:nvSpPr>
+          <p:cNvPr id="18" name="Content Placeholder 9">
+            <a:extLst>
+              <a:ext uri="{FF2B5EF4-FFF2-40B4-BE49-F238E27FC236}">
+                <a16:creationId xmlns:a16="http://schemas.microsoft.com/office/drawing/2014/main" id="{CEFCE1E6-B98F-4AD7-81E9-DE93FBB59177}"/>
+              </a:ext>
+            </a:extLst>
+          </p:cNvPr>
+          <p:cNvSpPr>
+            <a:spLocks noGrp="1"/>
+          </p:cNvSpPr>
+          <p:nvPr>
+            <p:ph idx="1"/>
+          </p:nvPr>
+        </p:nvSpPr>
+        <p:spPr>
+          <a:xfrm>
+            <a:off x="649225" y="2133600"/>
+            <a:ext cx="3650278" cy="3759253"/>
+          </a:xfrm>
+        </p:spPr>
+        <p:txBody>
+          <a:bodyPr>
+            <a:normAutofit/>
+          </a:bodyPr>
+          <a:lstStyle/>
+          <a:p>
+            <a:endParaRPr lang="en-US"/>
+          </a:p>
+        </p:txBody>
+      </p:sp>
+      <p:pic>
+        <p:nvPicPr>
+          <p:cNvPr id="19" name="Content Placeholder 4">
+            <a:extLst>
+              <a:ext uri="{FF2B5EF4-FFF2-40B4-BE49-F238E27FC236}">
+                <a16:creationId xmlns:a16="http://schemas.microsoft.com/office/drawing/2014/main" id="{F8D41180-E753-F940-A962-E936A46DB2B2}"/>
+              </a:ext>
+            </a:extLst>
+          </p:cNvPr>
+          <p:cNvPicPr>
+            <a:picLocks noChangeAspect="1"/>
+          </p:cNvPicPr>
+          <p:nvPr/>
+        </p:nvPicPr>
+        <p:blipFill>
+          <a:blip r:embed="rId2"/>
+          <a:stretch>
+            <a:fillRect/>
+          </a:stretch>
+        </p:blipFill>
+        <p:spPr>
+          <a:xfrm>
+            <a:off x="5129939" y="150196"/>
+            <a:ext cx="5021539" cy="6417304"/>
+          </a:xfrm>
+          <a:prstGeom prst="rect">
+            <a:avLst/>
+          </a:prstGeom>
+        </p:spPr>
+      </p:pic>
+      <p:sp>
+        <p:nvSpPr>
+          <p:cNvPr id="17" name="Freeform 11">
+            <a:extLst>
+              <a:ext uri="{FF2B5EF4-FFF2-40B4-BE49-F238E27FC236}">
+                <a16:creationId xmlns:a16="http://schemas.microsoft.com/office/drawing/2014/main" id="{7DE3414B-B032-4710-A468-D3285E38C5FF}"/>
+              </a:ext>
+              <a:ext uri="{C183D7F6-B498-43B3-948B-1728B52AA6E4}">
+                <adec:decorative xmlns:adec="http://schemas.microsoft.com/office/drawing/2017/decorative" val="1"/>
+              </a:ext>
+            </a:extLst>
+          </p:cNvPr>
+          <p:cNvSpPr>
+            <a:spLocks noGrp="1" noRot="1" noChangeAspect="1" noMove="1" noResize="1" noEditPoints="1" noAdjustHandles="1" noChangeArrowheads="1" noChangeShapeType="1" noTextEdit="1"/>
+          </p:cNvSpPr>
+          <p:nvPr>
+            <p:extLst>
+              <p:ext uri="{386F3935-93C4-4BCD-93E2-E3B085C9AB24}">
+                <p16:designElem xmlns:p16="http://schemas.microsoft.com/office/powerpoint/2015/main" val="1"/>
+              </p:ext>
+            </p:extLst>
+          </p:nvPr>
+        </p:nvSpPr>
+        <p:spPr>
+          <a:xfrm>
+            <a:off x="-1" y="6061223"/>
+            <a:ext cx="1038036" cy="506277"/>
+          </a:xfrm>
+          <a:custGeom>
+            <a:avLst/>
+            <a:gdLst>
+              <a:gd name="connsiteX0" fmla="*/ 0 w 1038036"/>
+              <a:gd name="connsiteY0" fmla="*/ 0 h 506277"/>
+              <a:gd name="connsiteX1" fmla="*/ 182880 w 1038036"/>
+              <a:gd name="connsiteY1" fmla="*/ 0 h 506277"/>
+              <a:gd name="connsiteX2" fmla="*/ 291705 w 1038036"/>
+              <a:gd name="connsiteY2" fmla="*/ 0 h 506277"/>
+              <a:gd name="connsiteX3" fmla="*/ 291705 w 1038036"/>
+              <a:gd name="connsiteY3" fmla="*/ 151 h 506277"/>
+              <a:gd name="connsiteX4" fmla="*/ 692049 w 1038036"/>
+              <a:gd name="connsiteY4" fmla="*/ 705 h 506277"/>
+              <a:gd name="connsiteX5" fmla="*/ 782744 w 1038036"/>
+              <a:gd name="connsiteY5" fmla="*/ 705 h 506277"/>
+              <a:gd name="connsiteX6" fmla="*/ 797001 w 1038036"/>
+              <a:gd name="connsiteY6" fmla="*/ 5473 h 506277"/>
+              <a:gd name="connsiteX7" fmla="*/ 801982 w 1038036"/>
+              <a:gd name="connsiteY7" fmla="*/ 10242 h 506277"/>
+              <a:gd name="connsiteX8" fmla="*/ 1030951 w 1038036"/>
+              <a:gd name="connsiteY8" fmla="*/ 239185 h 506277"/>
+              <a:gd name="connsiteX9" fmla="*/ 1030951 w 1038036"/>
+              <a:gd name="connsiteY9" fmla="*/ 267797 h 506277"/>
+              <a:gd name="connsiteX10" fmla="*/ 801982 w 1038036"/>
+              <a:gd name="connsiteY10" fmla="*/ 496740 h 506277"/>
+              <a:gd name="connsiteX11" fmla="*/ 797001 w 1038036"/>
+              <a:gd name="connsiteY11" fmla="*/ 501508 h 506277"/>
+              <a:gd name="connsiteX12" fmla="*/ 782744 w 1038036"/>
+              <a:gd name="connsiteY12" fmla="*/ 506277 h 506277"/>
+              <a:gd name="connsiteX13" fmla="*/ 692049 w 1038036"/>
+              <a:gd name="connsiteY13" fmla="*/ 506277 h 506277"/>
+              <a:gd name="connsiteX14" fmla="*/ 291705 w 1038036"/>
+              <a:gd name="connsiteY14" fmla="*/ 505140 h 506277"/>
+              <a:gd name="connsiteX15" fmla="*/ 291705 w 1038036"/>
+              <a:gd name="connsiteY15" fmla="*/ 506277 h 506277"/>
+              <a:gd name="connsiteX16" fmla="*/ 0 w 1038036"/>
+              <a:gd name="connsiteY16" fmla="*/ 506277 h 506277"/>
+            </a:gdLst>
+            <a:ahLst/>
+            <a:cxnLst>
+              <a:cxn ang="0">
+                <a:pos x="connsiteX0" y="connsiteY0"/>
+              </a:cxn>
+              <a:cxn ang="0">
+                <a:pos x="connsiteX1" y="connsiteY1"/>
+              </a:cxn>
+              <a:cxn ang="0">
+                <a:pos x="connsiteX2" y="connsiteY2"/>
+              </a:cxn>
+              <a:cxn ang="0">
+                <a:pos x="connsiteX3" y="connsiteY3"/>
+              </a:cxn>
+              <a:cxn ang="0">
+                <a:pos x="connsiteX4" y="connsiteY4"/>
+              </a:cxn>
+              <a:cxn ang="0">
+                <a:pos x="connsiteX5" y="connsiteY5"/>
+              </a:cxn>
+              <a:cxn ang="0">
+                <a:pos x="connsiteX6" y="connsiteY6"/>
+              </a:cxn>
+              <a:cxn ang="0">
+                <a:pos x="connsiteX7" y="connsiteY7"/>
+              </a:cxn>
+              <a:cxn ang="0">
+                <a:pos x="connsiteX8" y="connsiteY8"/>
+              </a:cxn>
+              <a:cxn ang="0">
+                <a:pos x="connsiteX9" y="connsiteY9"/>
+              </a:cxn>
+              <a:cxn ang="0">
+                <a:pos x="connsiteX10" y="connsiteY10"/>
+              </a:cxn>
+              <a:cxn ang="0">
+                <a:pos x="connsiteX11" y="connsiteY11"/>
+              </a:cxn>
+              <a:cxn ang="0">
+                <a:pos x="connsiteX12" y="connsiteY12"/>
+              </a:cxn>
+              <a:cxn ang="0">
+                <a:pos x="connsiteX13" y="connsiteY13"/>
+              </a:cxn>
+              <a:cxn ang="0">
+                <a:pos x="connsiteX14" y="connsiteY14"/>
+              </a:cxn>
+              <a:cxn ang="0">
+                <a:pos x="connsiteX15" y="connsiteY15"/>
+              </a:cxn>
+              <a:cxn ang="0">
+                <a:pos x="connsiteX16" y="connsiteY16"/>
+              </a:cxn>
+            </a:cxnLst>
+            <a:rect l="l" t="t" r="r" b="b"/>
+            <a:pathLst>
+              <a:path w="1038036" h="506277">
+                <a:moveTo>
+                  <a:pt x="0" y="0"/>
+                </a:moveTo>
+                <a:lnTo>
+                  <a:pt x="182880" y="0"/>
+                </a:lnTo>
+                <a:lnTo>
+                  <a:pt x="291705" y="0"/>
+                </a:lnTo>
+                <a:lnTo>
+                  <a:pt x="291705" y="151"/>
+                </a:lnTo>
+                <a:lnTo>
+                  <a:pt x="692049" y="705"/>
+                </a:lnTo>
+                <a:lnTo>
+                  <a:pt x="782744" y="705"/>
+                </a:lnTo>
+                <a:cubicBezTo>
+                  <a:pt x="787553" y="705"/>
+                  <a:pt x="792363" y="5473"/>
+                  <a:pt x="797001" y="5473"/>
+                </a:cubicBezTo>
+                <a:cubicBezTo>
+                  <a:pt x="797001" y="10242"/>
+                  <a:pt x="801982" y="10242"/>
+                  <a:pt x="801982" y="10242"/>
+                </a:cubicBezTo>
+                <a:lnTo>
+                  <a:pt x="1030951" y="239185"/>
+                </a:lnTo>
+                <a:cubicBezTo>
+                  <a:pt x="1040398" y="248722"/>
+                  <a:pt x="1040398" y="258259"/>
+                  <a:pt x="1030951" y="267797"/>
+                </a:cubicBezTo>
+                <a:lnTo>
+                  <a:pt x="801982" y="496740"/>
+                </a:lnTo>
+                <a:cubicBezTo>
+                  <a:pt x="800436" y="498363"/>
+                  <a:pt x="798547" y="499885"/>
+                  <a:pt x="797001" y="501508"/>
+                </a:cubicBezTo>
+                <a:cubicBezTo>
+                  <a:pt x="792363" y="506277"/>
+                  <a:pt x="787553" y="506277"/>
+                  <a:pt x="782744" y="506277"/>
+                </a:cubicBezTo>
+                <a:lnTo>
+                  <a:pt x="692049" y="506277"/>
+                </a:lnTo>
+                <a:lnTo>
+                  <a:pt x="291705" y="505140"/>
+                </a:lnTo>
+                <a:lnTo>
+                  <a:pt x="291705" y="506277"/>
+                </a:lnTo>
+                <a:lnTo>
+                  <a:pt x="0" y="506277"/>
+                </a:lnTo>
+                <a:close/>
+              </a:path>
+            </a:pathLst>
+          </a:custGeom>
+          <a:ln>
+            <a:noFill/>
+          </a:ln>
+        </p:spPr>
+        <p:style>
+          <a:lnRef idx="2">
+            <a:schemeClr val="accent1">
+              <a:shade val="50000"/>
+            </a:schemeClr>
+          </a:lnRef>
+          <a:fillRef idx="1">
+            <a:schemeClr val="accent1"/>
+          </a:fillRef>
+          <a:effectRef idx="0">
+            <a:schemeClr val="accent1"/>
+          </a:effectRef>
+          <a:fontRef idx="minor">
+            <a:schemeClr val="lt1"/>
+          </a:fontRef>
+        </p:style>
+        <p:txBody>
+          <a:bodyPr rtlCol="0" anchor="ctr"/>
+          <a:lstStyle/>
+          <a:p>
+            <a:pPr algn="ctr"/>
+            <a:endParaRPr lang="en-US"/>
+          </a:p>
+        </p:txBody>
+      </p:sp>
+    </p:spTree>
+    <p:extLst>
+      <p:ext uri="{BB962C8B-B14F-4D97-AF65-F5344CB8AC3E}">
+        <p14:creationId xmlns:p14="http://schemas.microsoft.com/office/powerpoint/2010/main" val="2933233609"/>
+      </p:ext>
+    </p:extLst>
+  </p:cSld>
+  <p:clrMapOvr>
+    <a:masterClrMapping/>
+  </p:clrMapOvr>
+</p:sld>
+</file>
+
+<file path=ppt/slides/slide5.xml><?xml version="1.0" encoding="utf-8"?>
+<p:sld xmlns:a="http://schemas.openxmlformats.org/drawingml/2006/main" xmlns:r="http://schemas.openxmlformats.org/officeDocument/2006/relationships" xmlns:p="http://schemas.openxmlformats.org/presentationml/2006/main">
+  <p:cSld>
+    <p:bg>
+      <p:bgPr>
+        <a:gradFill rotWithShape="1">
+          <a:gsLst>
+            <a:gs pos="0">
+              <a:schemeClr val="bg2">
+                <a:tint val="90000"/>
+                <a:satMod val="92000"/>
+                <a:lumMod val="120000"/>
+              </a:schemeClr>
+            </a:gs>
+            <a:gs pos="100000">
+              <a:schemeClr val="bg2">
+                <a:shade val="98000"/>
+                <a:satMod val="120000"/>
+                <a:lumMod val="98000"/>
+              </a:schemeClr>
+            </a:gs>
+          </a:gsLst>
+          <a:path path="circle">
+            <a:fillToRect l="50000" t="50000" r="100000" b="100000"/>
+          </a:path>
+        </a:gradFill>
+        <a:effectLst/>
+      </p:bgPr>
+    </p:bg>
+    <p:spTree>
+      <p:nvGrpSpPr>
+        <p:cNvPr id="1" name=""/>
+        <p:cNvGrpSpPr/>
+        <p:nvPr/>
+      </p:nvGrpSpPr>
+      <p:grpSpPr>
+        <a:xfrm>
+          <a:off x="0" y="0"/>
+          <a:ext cx="0" cy="0"/>
+          <a:chOff x="0" y="0"/>
+          <a:chExt cx="0" cy="0"/>
+        </a:xfrm>
+      </p:grpSpPr>
+      <p:sp useBgFill="1">
+        <p:nvSpPr>
+          <p:cNvPr id="10" name="Rectangle 9">
+            <a:extLst>
+              <a:ext uri="{FF2B5EF4-FFF2-40B4-BE49-F238E27FC236}">
+                <a16:creationId xmlns:a16="http://schemas.microsoft.com/office/drawing/2014/main" id="{BF7E8610-2DF7-4AF0-B876-0F3B7882A6B7}"/>
+              </a:ext>
+              <a:ext uri="{C183D7F6-B498-43B3-948B-1728B52AA6E4}">
+                <adec:decorative xmlns:adec="http://schemas.microsoft.com/office/drawing/2017/decorative" val="1"/>
+              </a:ext>
+            </a:extLst>
+          </p:cNvPr>
+          <p:cNvSpPr>
+            <a:spLocks noGrp="1" noRot="1" noChangeAspect="1" noMove="1" noResize="1" noEditPoints="1" noAdjustHandles="1" noChangeArrowheads="1" noChangeShapeType="1" noTextEdit="1"/>
+          </p:cNvSpPr>
+          <p:nvPr>
+            <p:extLst>
+              <p:ext uri="{386F3935-93C4-4BCD-93E2-E3B085C9AB24}">
+                <p16:designElem xmlns:p16="http://schemas.microsoft.com/office/powerpoint/2015/main" val="1"/>
+              </p:ext>
+            </p:extLst>
+          </p:nvPr>
+        </p:nvSpPr>
+        <p:spPr>
+          <a:xfrm>
+            <a:off x="1" y="0"/>
+            <a:ext cx="12192000" cy="6858000"/>
+          </a:xfrm>
+          <a:prstGeom prst="rect">
+            <a:avLst/>
+          </a:prstGeom>
+          <a:ln>
+            <a:noFill/>
+          </a:ln>
+        </p:spPr>
+        <p:style>
+          <a:lnRef idx="2">
+            <a:schemeClr val="accent1">
+              <a:shade val="50000"/>
+            </a:schemeClr>
+          </a:lnRef>
+          <a:fillRef idx="1">
+            <a:schemeClr val="accent1"/>
+          </a:fillRef>
+          <a:effectRef idx="0">
+            <a:schemeClr val="accent1"/>
+          </a:effectRef>
+          <a:fontRef idx="minor">
+            <a:schemeClr val="lt1"/>
+          </a:fontRef>
+        </p:style>
+        <p:txBody>
+          <a:bodyPr rtlCol="0" anchor="ctr"/>
+          <a:lstStyle/>
+          <a:p>
+            <a:pPr algn="ctr"/>
+            <a:endParaRPr lang="en-US"/>
+          </a:p>
+        </p:txBody>
+      </p:sp>
+      <p:sp>
+        <p:nvSpPr>
+          <p:cNvPr id="12" name="Rectangle 11">
+            <a:extLst>
+              <a:ext uri="{FF2B5EF4-FFF2-40B4-BE49-F238E27FC236}">
+                <a16:creationId xmlns:a16="http://schemas.microsoft.com/office/drawing/2014/main" id="{C1C8C023-62A6-4DA0-8DF4-3F4EA94090DE}"/>
+              </a:ext>
+              <a:ext uri="{C183D7F6-B498-43B3-948B-1728B52AA6E4}">
+                <adec:decorative xmlns:adec="http://schemas.microsoft.com/office/drawing/2017/decorative" val="1"/>
+              </a:ext>
+            </a:extLst>
+          </p:cNvPr>
+          <p:cNvSpPr>
+            <a:spLocks noGrp="1" noRot="1" noChangeAspect="1" noMove="1" noResize="1" noEditPoints="1" noAdjustHandles="1" noChangeArrowheads="1" noChangeShapeType="1" noTextEdit="1"/>
+          </p:cNvSpPr>
+          <p:nvPr>
+            <p:extLst>
+              <p:ext uri="{386F3935-93C4-4BCD-93E2-E3B085C9AB24}">
+                <p16:designElem xmlns:p16="http://schemas.microsoft.com/office/powerpoint/2015/main" val="1"/>
+              </p:ext>
+            </p:extLst>
+          </p:nvPr>
+        </p:nvSpPr>
+        <p:spPr>
+          <a:xfrm>
+            <a:off x="0" y="0"/>
+            <a:ext cx="12192000" cy="2306695"/>
+          </a:xfrm>
+          <a:prstGeom prst="rect">
+            <a:avLst/>
+          </a:prstGeom>
+          <a:solidFill>
+            <a:schemeClr val="tx2"/>
+          </a:solidFill>
+          <a:ln>
+            <a:noFill/>
+          </a:ln>
+          <a:effectLst/>
+        </p:spPr>
+        <p:style>
+          <a:lnRef idx="1">
+            <a:schemeClr val="accent1"/>
+          </a:lnRef>
+          <a:fillRef idx="3">
+            <a:schemeClr val="accent1"/>
+          </a:fillRef>
+          <a:effectRef idx="2">
+            <a:schemeClr val="accent1"/>
+          </a:effectRef>
+          <a:fontRef idx="minor">
+            <a:schemeClr val="lt1"/>
+          </a:fontRef>
+        </p:style>
+      </p:sp>
+      <p:sp>
+        <p:nvSpPr>
+          <p:cNvPr id="2" name="Title 1">
+            <a:extLst>
+              <a:ext uri="{FF2B5EF4-FFF2-40B4-BE49-F238E27FC236}">
+                <a16:creationId xmlns:a16="http://schemas.microsoft.com/office/drawing/2014/main" id="{2B42F450-3421-5F40-9D05-75146F08268D}"/>
+              </a:ext>
+            </a:extLst>
+          </p:cNvPr>
+          <p:cNvSpPr>
+            <a:spLocks noGrp="1"/>
+          </p:cNvSpPr>
+          <p:nvPr>
+            <p:ph type="title"/>
+          </p:nvPr>
+        </p:nvSpPr>
+        <p:spPr>
+          <a:xfrm>
+            <a:off x="1843391" y="624110"/>
+            <a:ext cx="9383408" cy="1280890"/>
+          </a:xfrm>
+        </p:spPr>
+        <p:txBody>
+          <a:bodyPr>
+            <a:normAutofit/>
+          </a:bodyPr>
+          <a:lstStyle/>
+          <a:p>
+            <a:r>
+              <a:rPr lang="en-US">
+                <a:solidFill>
+                  <a:schemeClr val="bg1"/>
+                </a:solidFill>
+              </a:rPr>
+              <a:t>							Strech Goals</a:t>
+            </a:r>
+          </a:p>
+        </p:txBody>
+      </p:sp>
+      <p:sp>
+        <p:nvSpPr>
+          <p:cNvPr id="14" name="Freeform 11">
+            <a:extLst>
+              <a:ext uri="{FF2B5EF4-FFF2-40B4-BE49-F238E27FC236}">
+                <a16:creationId xmlns:a16="http://schemas.microsoft.com/office/drawing/2014/main" id="{26B9FE07-322E-43FB-8707-C9826BD903EB}"/>
+              </a:ext>
+              <a:ext uri="{C183D7F6-B498-43B3-948B-1728B52AA6E4}">
+                <adec:decorative xmlns:adec="http://schemas.microsoft.com/office/drawing/2017/decorative" val="1"/>
+              </a:ext>
+            </a:extLst>
+          </p:cNvPr>
+          <p:cNvSpPr>
+            <a:spLocks noGrp="1" noRot="1" noChangeAspect="1" noMove="1" noResize="1" noEditPoints="1" noAdjustHandles="1" noChangeArrowheads="1" noChangeShapeType="1" noTextEdit="1"/>
+          </p:cNvSpPr>
+          <p:nvPr>
+            <p:extLst>
+              <p:ext uri="{386F3935-93C4-4BCD-93E2-E3B085C9AB24}">
+                <p16:designElem xmlns:p16="http://schemas.microsoft.com/office/powerpoint/2015/main" val="1"/>
+              </p:ext>
+            </p:extLst>
+          </p:nvPr>
+        </p:nvSpPr>
+        <p:spPr bwMode="auto">
+          <a:xfrm flipV="1">
+            <a:off x="-4189" y="714375"/>
+            <a:ext cx="1588527" cy="507297"/>
+          </a:xfrm>
+          <a:custGeom>
+            <a:avLst/>
+            <a:gdLst/>
+            <a:ahLst/>
+            <a:cxnLst/>
+            <a:rect l="l" t="t" r="r" b="b"/>
+            <a:pathLst>
+              <a:path w="9248" h="10000">
+                <a:moveTo>
+                  <a:pt x="9248" y="4701"/>
+                </a:moveTo>
+                <a:lnTo>
+                  <a:pt x="7915" y="188"/>
+                </a:lnTo>
+                <a:cubicBezTo>
+                  <a:pt x="7906" y="156"/>
+                  <a:pt x="7895" y="126"/>
+                  <a:pt x="7886" y="94"/>
+                </a:cubicBezTo>
+                <a:cubicBezTo>
+                  <a:pt x="7859" y="0"/>
+                  <a:pt x="7831" y="0"/>
+                  <a:pt x="7803" y="0"/>
+                </a:cubicBezTo>
+                <a:lnTo>
+                  <a:pt x="7275" y="0"/>
+                </a:lnTo>
+                <a:lnTo>
+                  <a:pt x="0" y="70"/>
+                </a:lnTo>
+                <a:cubicBezTo>
+                  <a:pt x="8" y="3380"/>
+                  <a:pt x="17" y="6690"/>
+                  <a:pt x="25" y="10000"/>
+                </a:cubicBezTo>
+                <a:lnTo>
+                  <a:pt x="7275" y="9966"/>
+                </a:lnTo>
+                <a:lnTo>
+                  <a:pt x="7803" y="9966"/>
+                </a:lnTo>
+                <a:cubicBezTo>
+                  <a:pt x="7831" y="9966"/>
+                  <a:pt x="7859" y="9872"/>
+                  <a:pt x="7886" y="9872"/>
+                </a:cubicBezTo>
+                <a:cubicBezTo>
+                  <a:pt x="7886" y="9778"/>
+                  <a:pt x="7915" y="9778"/>
+                  <a:pt x="7915" y="9778"/>
+                </a:cubicBezTo>
+                <a:lnTo>
+                  <a:pt x="9248" y="5265"/>
+                </a:lnTo>
+                <a:cubicBezTo>
+                  <a:pt x="9303" y="5077"/>
+                  <a:pt x="9303" y="4889"/>
+                  <a:pt x="9248" y="4701"/>
+                </a:cubicBezTo>
+                <a:close/>
+              </a:path>
+            </a:pathLst>
+          </a:custGeom>
+          <a:solidFill>
+            <a:schemeClr val="accent1"/>
+          </a:solidFill>
+          <a:ln>
+            <a:noFill/>
+          </a:ln>
+        </p:spPr>
+      </p:sp>
+      <p:graphicFrame>
+        <p:nvGraphicFramePr>
+          <p:cNvPr id="5" name="Content Placeholder 2">
+            <a:extLst>
+              <a:ext uri="{FF2B5EF4-FFF2-40B4-BE49-F238E27FC236}">
+                <a16:creationId xmlns:a16="http://schemas.microsoft.com/office/drawing/2014/main" id="{1CFD65D6-D051-4AEF-A0EE-317A7A9B9532}"/>
+              </a:ext>
+            </a:extLst>
+          </p:cNvPr>
+          <p:cNvGraphicFramePr>
+            <a:graphicFrameLocks noGrp="1"/>
+          </p:cNvGraphicFramePr>
+          <p:nvPr>
+            <p:ph idx="1"/>
+            <p:extLst>
+              <p:ext uri="{D42A27DB-BD31-4B8C-83A1-F6EECF244321}">
+                <p14:modId xmlns:p14="http://schemas.microsoft.com/office/powerpoint/2010/main" val="3978970735"/>
+              </p:ext>
+            </p:extLst>
+          </p:nvPr>
+        </p:nvGraphicFramePr>
+        <p:xfrm>
+          <a:off x="961012" y="2930805"/>
+          <a:ext cx="10265786" cy="2961996"/>
+        </p:xfrm>
+        <a:graphic>
+          <a:graphicData uri="http://schemas.openxmlformats.org/drawingml/2006/diagram">
+            <dgm:relIds xmlns:dgm="http://schemas.openxmlformats.org/drawingml/2006/diagram" xmlns:r="http://schemas.openxmlformats.org/officeDocument/2006/relationships" r:dm="rId2" r:lo="rId3" r:qs="rId4" r:cs="rId5"/>
+          </a:graphicData>
+        </a:graphic>
+      </p:graphicFrame>
+    </p:spTree>
+    <p:extLst>
+      <p:ext uri="{BB962C8B-B14F-4D97-AF65-F5344CB8AC3E}">
+        <p14:creationId xmlns:p14="http://schemas.microsoft.com/office/powerpoint/2010/main" val="3784892021"/>
+      </p:ext>
+    </p:extLst>
+  </p:cSld>
+  <p:clrMapOvr>
+    <a:masterClrMapping/>
+  </p:clrMapOvr>
+</p:sld>
+</file>
+
+<file path=ppt/slides/slide6.xml><?xml version="1.0" encoding="utf-8"?>
+<p:sld xmlns:a="http://schemas.openxmlformats.org/drawingml/2006/main" xmlns:r="http://schemas.openxmlformats.org/officeDocument/2006/relationships" xmlns:p="http://schemas.openxmlformats.org/presentationml/2006/main">
+  <p:cSld>
+    <p:bg>
+      <p:bgPr>
+        <a:gradFill rotWithShape="1">
+          <a:gsLst>
+            <a:gs pos="0">
+              <a:schemeClr val="bg2">
+                <a:tint val="90000"/>
+                <a:satMod val="92000"/>
+                <a:lumMod val="120000"/>
+              </a:schemeClr>
+            </a:gs>
+            <a:gs pos="100000">
+              <a:schemeClr val="bg2">
+                <a:shade val="98000"/>
+                <a:satMod val="120000"/>
+                <a:lumMod val="98000"/>
+              </a:schemeClr>
+            </a:gs>
+          </a:gsLst>
+          <a:path path="circle">
+            <a:fillToRect l="50000" t="50000" r="100000" b="100000"/>
+          </a:path>
+        </a:gradFill>
+        <a:effectLst/>
+      </p:bgPr>
+    </p:bg>
+    <p:spTree>
+      <p:nvGrpSpPr>
+        <p:cNvPr id="1" name=""/>
+        <p:cNvGrpSpPr/>
+        <p:nvPr/>
+      </p:nvGrpSpPr>
+      <p:grpSpPr>
+        <a:xfrm>
+          <a:off x="0" y="0"/>
+          <a:ext cx="0" cy="0"/>
+          <a:chOff x="0" y="0"/>
+          <a:chExt cx="0" cy="0"/>
+        </a:xfrm>
+      </p:grpSpPr>
       <p:sp>
         <p:nvSpPr>
           <p:cNvPr id="10" name="Rectangle 9">
@@ -23361,7 +27219,7 @@
 </p:sld>
 </file>
 
-<file path=ppt/slides/slide5.xml><?xml version="1.0" encoding="utf-8"?>
+<file path=ppt/slides/slide7.xml><?xml version="1.0" encoding="utf-8"?>
 <p:sld xmlns:a="http://schemas.openxmlformats.org/drawingml/2006/main" xmlns:r="http://schemas.openxmlformats.org/officeDocument/2006/relationships" xmlns:p="http://schemas.openxmlformats.org/presentationml/2006/main">
   <p:cSld>
     <p:bg>
@@ -23872,7 +27730,7 @@
 </p:sld>
 </file>
 
-<file path=ppt/slides/slide6.xml><?xml version="1.0" encoding="utf-8"?>
+<file path=ppt/slides/slide8.xml><?xml version="1.0" encoding="utf-8"?>
 <p:sld xmlns:a="http://schemas.openxmlformats.org/drawingml/2006/main" xmlns:r="http://schemas.openxmlformats.org/officeDocument/2006/relationships" xmlns:p="http://schemas.openxmlformats.org/presentationml/2006/main">
   <p:cSld>
     <p:bg>
@@ -24211,7 +28069,7 @@
 </p:sld>
 </file>
 
-<file path=ppt/slides/slide7.xml><?xml version="1.0" encoding="utf-8"?>
+<file path=ppt/slides/slide9.xml><?xml version="1.0" encoding="utf-8"?>
 <p:sld xmlns:a="http://schemas.openxmlformats.org/drawingml/2006/main" xmlns:r="http://schemas.openxmlformats.org/officeDocument/2006/relationships" xmlns:p="http://schemas.openxmlformats.org/presentationml/2006/main">
   <p:cSld>
     <p:bg>

</xml_diff>